<commit_message>
update plots of population
</commit_message>
<xml_diff>
--- a/results-presentations/model-test-BAOBAB.pptx
+++ b/results-presentations/model-test-BAOBAB.pptx
@@ -5,12 +5,15 @@
     <p:sldMasterId id="2147483648" r:id="rId1"/>
   </p:sldMasterIdLst>
   <p:notesMasterIdLst>
-    <p:notesMasterId r:id="rId5"/>
+    <p:notesMasterId r:id="rId8"/>
   </p:notesMasterIdLst>
   <p:sldIdLst>
     <p:sldId id="256" r:id="rId2"/>
-    <p:sldId id="260" r:id="rId3"/>
-    <p:sldId id="261" r:id="rId4"/>
+    <p:sldId id="262" r:id="rId3"/>
+    <p:sldId id="263" r:id="rId4"/>
+    <p:sldId id="260" r:id="rId5"/>
+    <p:sldId id="261" r:id="rId6"/>
+    <p:sldId id="264" r:id="rId7"/>
   </p:sldIdLst>
   <p:sldSz cx="12192000" cy="6858000"/>
   <p:notesSz cx="6858000" cy="9144000"/>
@@ -109,7 +112,150 @@
       </a:defRPr>
     </a:lvl9pPr>
   </p:defaultTextStyle>
+  <p:extLst>
+    <p:ext uri="{EFAFB233-063F-42B5-8137-9DF3F51BA10A}">
+      <p15:sldGuideLst xmlns:p15="http://schemas.microsoft.com/office/powerpoint/2012/main"/>
+    </p:ext>
+  </p:extLst>
 </p:presentation>
+</file>
+
+<file path=ppt/revisionInfo.xml><?xml version="1.0" encoding="utf-8"?>
+<p1510:revInfo xmlns:a="http://schemas.openxmlformats.org/drawingml/2006/main" xmlns:r="http://schemas.openxmlformats.org/officeDocument/2006/relationships" xmlns:p1510="http://schemas.microsoft.com/office/powerpoint/2015/10/main">
+  <p1510:revLst>
+    <p1510:client id="{A1FE3073-CEB4-3140-B0CA-5FEA12E5C3D9}" v="3" dt="2023-02-28T11:45:53.507"/>
+  </p1510:revLst>
+</p1510:revInfo>
+</file>
+
+<file path=ppt/changesInfos/changesInfo1.xml><?xml version="1.0" encoding="utf-8"?>
+<pc:chgInfo xmlns:a="http://schemas.openxmlformats.org/drawingml/2006/main" xmlns:r="http://schemas.openxmlformats.org/officeDocument/2006/relationships" xmlns:ac="http://schemas.microsoft.com/office/drawing/2013/main/command" xmlns:pc="http://schemas.microsoft.com/office/powerpoint/2013/main/command">
+  <pc:docChgLst>
+    <pc:chgData name="Savagar, Bethan Alice" userId="dc0b6509-dca5-46f6-b355-e03f7348faa9" providerId="ADAL" clId="{A1FE3073-CEB4-3140-B0CA-5FEA12E5C3D9}"/>
+    <pc:docChg chg="undo custSel addSld modSld">
+      <pc:chgData name="Savagar, Bethan Alice" userId="dc0b6509-dca5-46f6-b355-e03f7348faa9" providerId="ADAL" clId="{A1FE3073-CEB4-3140-B0CA-5FEA12E5C3D9}" dt="2023-02-28T12:01:14.033" v="495" actId="20577"/>
+      <pc:docMkLst>
+        <pc:docMk/>
+      </pc:docMkLst>
+      <pc:sldChg chg="modNotesTx">
+        <pc:chgData name="Savagar, Bethan Alice" userId="dc0b6509-dca5-46f6-b355-e03f7348faa9" providerId="ADAL" clId="{A1FE3073-CEB4-3140-B0CA-5FEA12E5C3D9}" dt="2023-02-28T12:01:14.033" v="495" actId="20577"/>
+        <pc:sldMkLst>
+          <pc:docMk/>
+          <pc:sldMk cId="2073572194" sldId="260"/>
+        </pc:sldMkLst>
+      </pc:sldChg>
+      <pc:sldChg chg="addSp delSp modSp new mod setBg modNotesTx">
+        <pc:chgData name="Savagar, Bethan Alice" userId="dc0b6509-dca5-46f6-b355-e03f7348faa9" providerId="ADAL" clId="{A1FE3073-CEB4-3140-B0CA-5FEA12E5C3D9}" dt="2023-02-28T11:46:53.159" v="139" actId="20577"/>
+        <pc:sldMkLst>
+          <pc:docMk/>
+          <pc:sldMk cId="1361513349" sldId="262"/>
+        </pc:sldMkLst>
+        <pc:spChg chg="mod">
+          <ac:chgData name="Savagar, Bethan Alice" userId="dc0b6509-dca5-46f6-b355-e03f7348faa9" providerId="ADAL" clId="{A1FE3073-CEB4-3140-B0CA-5FEA12E5C3D9}" dt="2023-02-28T11:39:52.036" v="94" actId="26606"/>
+          <ac:spMkLst>
+            <pc:docMk/>
+            <pc:sldMk cId="1361513349" sldId="262"/>
+            <ac:spMk id="2" creationId="{1B6688C9-0601-6784-CCC2-33D20AABBF9E}"/>
+          </ac:spMkLst>
+        </pc:spChg>
+        <pc:spChg chg="del">
+          <ac:chgData name="Savagar, Bethan Alice" userId="dc0b6509-dca5-46f6-b355-e03f7348faa9" providerId="ADAL" clId="{A1FE3073-CEB4-3140-B0CA-5FEA12E5C3D9}" dt="2023-02-28T11:39:52.036" v="94" actId="26606"/>
+          <ac:spMkLst>
+            <pc:docMk/>
+            <pc:sldMk cId="1361513349" sldId="262"/>
+            <ac:spMk id="3" creationId="{11353860-457B-D721-0CCE-D679C9CDC7E6}"/>
+          </ac:spMkLst>
+        </pc:spChg>
+        <pc:spChg chg="add mod">
+          <ac:chgData name="Savagar, Bethan Alice" userId="dc0b6509-dca5-46f6-b355-e03f7348faa9" providerId="ADAL" clId="{A1FE3073-CEB4-3140-B0CA-5FEA12E5C3D9}" dt="2023-02-28T11:46:30.055" v="121" actId="1076"/>
+          <ac:spMkLst>
+            <pc:docMk/>
+            <pc:sldMk cId="1361513349" sldId="262"/>
+            <ac:spMk id="10" creationId="{4298E43C-1FBE-622C-E185-AB0D6DD6F52A}"/>
+          </ac:spMkLst>
+        </pc:spChg>
+        <pc:picChg chg="add mod">
+          <ac:chgData name="Savagar, Bethan Alice" userId="dc0b6509-dca5-46f6-b355-e03f7348faa9" providerId="ADAL" clId="{A1FE3073-CEB4-3140-B0CA-5FEA12E5C3D9}" dt="2023-02-28T11:44:48.823" v="104" actId="1076"/>
+          <ac:picMkLst>
+            <pc:docMk/>
+            <pc:sldMk cId="1361513349" sldId="262"/>
+            <ac:picMk id="4" creationId="{EBE65530-7438-00EE-FEC1-EFCFF2A8FF1E}"/>
+          </ac:picMkLst>
+        </pc:picChg>
+        <pc:picChg chg="add mod">
+          <ac:chgData name="Savagar, Bethan Alice" userId="dc0b6509-dca5-46f6-b355-e03f7348faa9" providerId="ADAL" clId="{A1FE3073-CEB4-3140-B0CA-5FEA12E5C3D9}" dt="2023-02-28T11:44:53.336" v="106" actId="1076"/>
+          <ac:picMkLst>
+            <pc:docMk/>
+            <pc:sldMk cId="1361513349" sldId="262"/>
+            <ac:picMk id="5" creationId="{9E909BD6-7F82-25B9-EF20-6615FE3841E7}"/>
+          </ac:picMkLst>
+        </pc:picChg>
+        <pc:cxnChg chg="add mod">
+          <ac:chgData name="Savagar, Bethan Alice" userId="dc0b6509-dca5-46f6-b355-e03f7348faa9" providerId="ADAL" clId="{A1FE3073-CEB4-3140-B0CA-5FEA12E5C3D9}" dt="2023-02-28T11:45:49.147" v="113" actId="1582"/>
+          <ac:cxnSpMkLst>
+            <pc:docMk/>
+            <pc:sldMk cId="1361513349" sldId="262"/>
+            <ac:cxnSpMk id="7" creationId="{D8AC02E2-2CC6-0C2F-E225-58A9B58ACE30}"/>
+          </ac:cxnSpMkLst>
+        </pc:cxnChg>
+        <pc:cxnChg chg="add mod">
+          <ac:chgData name="Savagar, Bethan Alice" userId="dc0b6509-dca5-46f6-b355-e03f7348faa9" providerId="ADAL" clId="{A1FE3073-CEB4-3140-B0CA-5FEA12E5C3D9}" dt="2023-02-28T11:46:06.916" v="116" actId="1076"/>
+          <ac:cxnSpMkLst>
+            <pc:docMk/>
+            <pc:sldMk cId="1361513349" sldId="262"/>
+            <ac:cxnSpMk id="8" creationId="{F4933424-D00D-8E14-5B3C-1F727FE5C45D}"/>
+          </ac:cxnSpMkLst>
+        </pc:cxnChg>
+      </pc:sldChg>
+      <pc:sldChg chg="addSp delSp modSp new mod modNotesTx">
+        <pc:chgData name="Savagar, Bethan Alice" userId="dc0b6509-dca5-46f6-b355-e03f7348faa9" providerId="ADAL" clId="{A1FE3073-CEB4-3140-B0CA-5FEA12E5C3D9}" dt="2023-02-28T11:51:15.525" v="463" actId="20577"/>
+        <pc:sldMkLst>
+          <pc:docMk/>
+          <pc:sldMk cId="3929642493" sldId="263"/>
+        </pc:sldMkLst>
+        <pc:spChg chg="mod">
+          <ac:chgData name="Savagar, Bethan Alice" userId="dc0b6509-dca5-46f6-b355-e03f7348faa9" providerId="ADAL" clId="{A1FE3073-CEB4-3140-B0CA-5FEA12E5C3D9}" dt="2023-02-28T11:48:24.448" v="151" actId="20577"/>
+          <ac:spMkLst>
+            <pc:docMk/>
+            <pc:sldMk cId="3929642493" sldId="263"/>
+            <ac:spMk id="2" creationId="{886AA6A4-35E3-0AA1-51AC-149697AD0686}"/>
+          </ac:spMkLst>
+        </pc:spChg>
+        <pc:spChg chg="del mod">
+          <ac:chgData name="Savagar, Bethan Alice" userId="dc0b6509-dca5-46f6-b355-e03f7348faa9" providerId="ADAL" clId="{A1FE3073-CEB4-3140-B0CA-5FEA12E5C3D9}" dt="2023-02-28T11:49:22.225" v="173" actId="478"/>
+          <ac:spMkLst>
+            <pc:docMk/>
+            <pc:sldMk cId="3929642493" sldId="263"/>
+            <ac:spMk id="3" creationId="{2D4704C9-F23B-16D7-DD6B-C8D8DFB09E2E}"/>
+          </ac:spMkLst>
+        </pc:spChg>
+        <pc:spChg chg="add mod">
+          <ac:chgData name="Savagar, Bethan Alice" userId="dc0b6509-dca5-46f6-b355-e03f7348faa9" providerId="ADAL" clId="{A1FE3073-CEB4-3140-B0CA-5FEA12E5C3D9}" dt="2023-02-28T11:50:08.749" v="208" actId="20577"/>
+          <ac:spMkLst>
+            <pc:docMk/>
+            <pc:sldMk cId="3929642493" sldId="263"/>
+            <ac:spMk id="5" creationId="{BBF75125-788D-4D03-EC0A-A3C284BEC4EF}"/>
+          </ac:spMkLst>
+        </pc:spChg>
+      </pc:sldChg>
+      <pc:sldChg chg="addSp new mod">
+        <pc:chgData name="Savagar, Bethan Alice" userId="dc0b6509-dca5-46f6-b355-e03f7348faa9" providerId="ADAL" clId="{A1FE3073-CEB4-3140-B0CA-5FEA12E5C3D9}" dt="2023-02-28T11:58:55.112" v="465" actId="22"/>
+        <pc:sldMkLst>
+          <pc:docMk/>
+          <pc:sldMk cId="2166822845" sldId="264"/>
+        </pc:sldMkLst>
+        <pc:spChg chg="add">
+          <ac:chgData name="Savagar, Bethan Alice" userId="dc0b6509-dca5-46f6-b355-e03f7348faa9" providerId="ADAL" clId="{A1FE3073-CEB4-3140-B0CA-5FEA12E5C3D9}" dt="2023-02-28T11:58:55.112" v="465" actId="22"/>
+          <ac:spMkLst>
+            <pc:docMk/>
+            <pc:sldMk cId="2166822845" sldId="264"/>
+            <ac:spMk id="3" creationId="{2CEAF43A-3C94-8B4E-2E3A-71E8CE67926E}"/>
+          </ac:spMkLst>
+        </pc:spChg>
+      </pc:sldChg>
+    </pc:docChg>
+  </pc:docChgLst>
+</pc:chgInfo>
 </file>
 
 <file path=ppt/notesMasters/notesMaster1.xml><?xml version="1.0" encoding="utf-8"?>
@@ -194,7 +340,7 @@
           <a:p>
             <a:fld id="{12BFABB2-EEA0-864E-BF55-7EF7D8AD924B}" type="datetimeFigureOut">
               <a:rPr lang="en-US" smtClean="0"/>
-              <a:t>2/9/23</a:t>
+              <a:t>2/27/23</a:t>
             </a:fld>
             <a:endParaRPr lang="en-US"/>
           </a:p>
@@ -507,27 +653,228 @@
           <a:lstStyle/>
           <a:p>
             <a:r>
-              <a:rPr lang="en-US" dirty="0"/>
-              <a:t>BAOBAB data</a:t>
-            </a:r>
-          </a:p>
-          <a:p>
-            <a:r>
-              <a:rPr lang="en-US" dirty="0"/>
-              <a:t>Downward trend – probably due to misinterpreting parameters (especially reproductive rate)</a:t>
-            </a:r>
-          </a:p>
-          <a:p>
-            <a:r>
-              <a:rPr lang="en-US" dirty="0"/>
-              <a:t>BAOBAB data doesn’t differentiate male and female rates</a:t>
-            </a:r>
-          </a:p>
-          <a:p>
-            <a:r>
-              <a:rPr lang="en-US" dirty="0"/>
-              <a:t>Nb. NET offtake is 0</a:t>
-            </a:r>
+              <a:rPr lang="en-GB" sz="1800" i="1" dirty="0" err="1">
+                <a:effectLst/>
+                <a:latin typeface="Calibri" panose="020F0502020204030204" pitchFamily="34" charset="0"/>
+                <a:ea typeface="Calibri" panose="020F0502020204030204" pitchFamily="34" charset="0"/>
+                <a:cs typeface="Times New Roman" panose="02020603050405020304" pitchFamily="18" charset="0"/>
+              </a:rPr>
+              <a:t>Bodjo</a:t>
+            </a:r>
+            <a:r>
+              <a:rPr lang="en-GB" sz="1800" i="1" dirty="0">
+                <a:effectLst/>
+                <a:latin typeface="Calibri" panose="020F0502020204030204" pitchFamily="34" charset="0"/>
+                <a:ea typeface="Calibri" panose="020F0502020204030204" pitchFamily="34" charset="0"/>
+                <a:cs typeface="Times New Roman" panose="02020603050405020304" pitchFamily="18" charset="0"/>
+              </a:rPr>
+              <a:t> et al.</a:t>
+            </a:r>
+            <a:endParaRPr lang="en-GB" sz="1800" dirty="0">
+              <a:effectLst/>
+              <a:latin typeface="Calibri" panose="020F0502020204030204" pitchFamily="34" charset="0"/>
+              <a:ea typeface="Calibri" panose="020F0502020204030204" pitchFamily="34" charset="0"/>
+              <a:cs typeface="Times New Roman" panose="02020603050405020304" pitchFamily="18" charset="0"/>
+            </a:endParaRPr>
+          </a:p>
+          <a:p>
+            <a:r>
+              <a:rPr lang="en-GB" sz="1800" i="1" dirty="0">
+                <a:effectLst/>
+                <a:latin typeface="Calibri" panose="020F0502020204030204" pitchFamily="34" charset="0"/>
+                <a:ea typeface="Calibri" panose="020F0502020204030204" pitchFamily="34" charset="0"/>
+                <a:cs typeface="Times New Roman" panose="02020603050405020304" pitchFamily="18" charset="0"/>
+              </a:rPr>
+              <a:t> </a:t>
+            </a:r>
+            <a:endParaRPr lang="en-GB" sz="1800" dirty="0">
+              <a:effectLst/>
+              <a:latin typeface="Calibri" panose="020F0502020204030204" pitchFamily="34" charset="0"/>
+              <a:ea typeface="Calibri" panose="020F0502020204030204" pitchFamily="34" charset="0"/>
+              <a:cs typeface="Times New Roman" panose="02020603050405020304" pitchFamily="18" charset="0"/>
+            </a:endParaRPr>
+          </a:p>
+          <a:p>
+            <a:pPr marL="342900" lvl="0" indent="-342900">
+              <a:buFont typeface="Symbol" pitchFamily="2" charset="2"/>
+              <a:buChar char=""/>
+            </a:pPr>
+            <a:r>
+              <a:rPr lang="en-GB" sz="1800" dirty="0">
+                <a:effectLst/>
+                <a:latin typeface="Calibri" panose="020F0502020204030204" pitchFamily="34" charset="0"/>
+                <a:ea typeface="Calibri" panose="020F0502020204030204" pitchFamily="34" charset="0"/>
+                <a:cs typeface="Times New Roman" panose="02020603050405020304" pitchFamily="18" charset="0"/>
+              </a:rPr>
+              <a:t>Tested duration of maternal immunity in 112 lambs up to 150 days after birth, born to ewes vaccinated with the homologous PPR vaccine “Nigeria 75/1" at day 90 and day 120 of pregnancy.</a:t>
+            </a:r>
+          </a:p>
+          <a:p>
+            <a:pPr marL="342900" lvl="0" indent="-342900">
+              <a:buFont typeface="Symbol" pitchFamily="2" charset="2"/>
+              <a:buChar char=""/>
+            </a:pPr>
+            <a:r>
+              <a:rPr lang="en-GB" sz="1800" dirty="0">
+                <a:effectLst/>
+                <a:latin typeface="Calibri" panose="020F0502020204030204" pitchFamily="34" charset="0"/>
+                <a:ea typeface="Calibri" panose="020F0502020204030204" pitchFamily="34" charset="0"/>
+                <a:cs typeface="Times New Roman" panose="02020603050405020304" pitchFamily="18" charset="0"/>
+              </a:rPr>
+              <a:t>Results (seropositivity):</a:t>
+            </a:r>
+          </a:p>
+          <a:p>
+            <a:pPr marL="342900" lvl="0" indent="-342900">
+              <a:buFont typeface="Symbol" pitchFamily="2" charset="2"/>
+              <a:buChar char=""/>
+            </a:pPr>
+            <a:r>
+              <a:rPr lang="en-GB" sz="1800" dirty="0">
+                <a:effectLst/>
+                <a:latin typeface="Calibri" panose="020F0502020204030204" pitchFamily="34" charset="0"/>
+                <a:ea typeface="Calibri" panose="020F0502020204030204" pitchFamily="34" charset="0"/>
+                <a:cs typeface="Times New Roman" panose="02020603050405020304" pitchFamily="18" charset="0"/>
+              </a:rPr>
+              <a:t>Day 15 = 92%, Day 30 = 89.3%, day 45 = 84%, day 60 = 70.5%, day 75 = 32%, day 90 = 5.3% , day 105 = 4.5%, day 120 – 4.5%, day 135 = 1.8%, Day 150 = 1.8%</a:t>
+            </a:r>
+          </a:p>
+          <a:p>
+            <a:endParaRPr lang="en-US" dirty="0"/>
+          </a:p>
+          <a:p>
+            <a:endParaRPr lang="en-US" dirty="0"/>
+          </a:p>
+          <a:p>
+            <a:r>
+              <a:rPr lang="en-GB" sz="1200" dirty="0">
+                <a:effectLst/>
+                <a:latin typeface="Calibri" panose="020F0502020204030204" pitchFamily="34" charset="0"/>
+                <a:ea typeface="Calibri" panose="020F0502020204030204" pitchFamily="34" charset="0"/>
+                <a:cs typeface="Times New Roman" panose="02020603050405020304" pitchFamily="18" charset="0"/>
+              </a:rPr>
+              <a:t>Decision:</a:t>
+            </a:r>
+          </a:p>
+          <a:p>
+            <a:pPr marL="342900" lvl="0" indent="-342900">
+              <a:buFont typeface="Calibri" panose="020F0502020204030204" pitchFamily="34" charset="0"/>
+              <a:buChar char="-"/>
+            </a:pPr>
+            <a:r>
+              <a:rPr lang="en-GB" sz="1200" dirty="0">
+                <a:effectLst/>
+                <a:latin typeface="Calibri" panose="020F0502020204030204" pitchFamily="34" charset="0"/>
+                <a:ea typeface="Calibri" panose="020F0502020204030204" pitchFamily="34" charset="0"/>
+                <a:cs typeface="Times New Roman" panose="02020603050405020304" pitchFamily="18" charset="0"/>
+              </a:rPr>
+              <a:t>Follow trend of </a:t>
+            </a:r>
+            <a:r>
+              <a:rPr lang="en-GB" sz="1200" dirty="0" err="1">
+                <a:effectLst/>
+                <a:latin typeface="Calibri" panose="020F0502020204030204" pitchFamily="34" charset="0"/>
+                <a:ea typeface="Calibri" panose="020F0502020204030204" pitchFamily="34" charset="0"/>
+                <a:cs typeface="Times New Roman" panose="02020603050405020304" pitchFamily="18" charset="0"/>
+              </a:rPr>
+              <a:t>Bodjo</a:t>
+            </a:r>
+            <a:r>
+              <a:rPr lang="en-GB" sz="1200" dirty="0">
+                <a:effectLst/>
+                <a:latin typeface="Calibri" panose="020F0502020204030204" pitchFamily="34" charset="0"/>
+                <a:ea typeface="Calibri" panose="020F0502020204030204" pitchFamily="34" charset="0"/>
+                <a:cs typeface="Times New Roman" panose="02020603050405020304" pitchFamily="18" charset="0"/>
+              </a:rPr>
+              <a:t> (supported by </a:t>
+            </a:r>
+            <a:r>
+              <a:rPr lang="en-GB" sz="1200" dirty="0" err="1">
+                <a:effectLst/>
+                <a:latin typeface="Calibri" panose="020F0502020204030204" pitchFamily="34" charset="0"/>
+                <a:ea typeface="Calibri" panose="020F0502020204030204" pitchFamily="34" charset="0"/>
+                <a:cs typeface="Times New Roman" panose="02020603050405020304" pitchFamily="18" charset="0"/>
+              </a:rPr>
+              <a:t>markus</a:t>
+            </a:r>
+            <a:r>
+              <a:rPr lang="en-GB" sz="1200" dirty="0">
+                <a:effectLst/>
+                <a:latin typeface="Calibri" panose="020F0502020204030204" pitchFamily="34" charset="0"/>
+                <a:ea typeface="Calibri" panose="020F0502020204030204" pitchFamily="34" charset="0"/>
+                <a:cs typeface="Times New Roman" panose="02020603050405020304" pitchFamily="18" charset="0"/>
+              </a:rPr>
+              <a:t>) with datapoints every 2 weeks (14days) - can fill in the midpoints for weekly decay</a:t>
+            </a:r>
+          </a:p>
+          <a:p>
+            <a:pPr marL="342900" lvl="0" indent="-342900">
+              <a:buFont typeface="Calibri" panose="020F0502020204030204" pitchFamily="34" charset="0"/>
+              <a:buChar char="-"/>
+            </a:pPr>
+            <a:r>
+              <a:rPr lang="en-GB" sz="1200" dirty="0">
+                <a:effectLst/>
+                <a:latin typeface="Calibri" panose="020F0502020204030204" pitchFamily="34" charset="0"/>
+                <a:ea typeface="Calibri" panose="020F0502020204030204" pitchFamily="34" charset="0"/>
+                <a:cs typeface="Times New Roman" panose="02020603050405020304" pitchFamily="18" charset="0"/>
+              </a:rPr>
+              <a:t>Set maternal immunity to last until 4</a:t>
+            </a:r>
+            <a:r>
+              <a:rPr lang="en-GB" sz="1200" baseline="30000" dirty="0">
+                <a:effectLst/>
+                <a:latin typeface="Calibri" panose="020F0502020204030204" pitchFamily="34" charset="0"/>
+                <a:ea typeface="Calibri" panose="020F0502020204030204" pitchFamily="34" charset="0"/>
+                <a:cs typeface="Times New Roman" panose="02020603050405020304" pitchFamily="18" charset="0"/>
+              </a:rPr>
+              <a:t>th</a:t>
+            </a:r>
+            <a:r>
+              <a:rPr lang="en-GB" sz="1200" dirty="0">
+                <a:effectLst/>
+                <a:latin typeface="Calibri" panose="020F0502020204030204" pitchFamily="34" charset="0"/>
+                <a:ea typeface="Calibri" panose="020F0502020204030204" pitchFamily="34" charset="0"/>
+                <a:cs typeface="Times New Roman" panose="02020603050405020304" pitchFamily="18" charset="0"/>
+              </a:rPr>
+              <a:t> month, day 119, week 17 (week 17 = 0 immunity)</a:t>
+            </a:r>
+          </a:p>
+          <a:p>
+            <a:pPr marL="742950" lvl="1" indent="-285750">
+              <a:buFont typeface="Courier New" panose="02070309020205020404" pitchFamily="49" charset="0"/>
+              <a:buChar char="o"/>
+            </a:pPr>
+            <a:r>
+              <a:rPr lang="en-GB" sz="1200" dirty="0">
+                <a:effectLst/>
+                <a:latin typeface="Calibri" panose="020F0502020204030204" pitchFamily="34" charset="0"/>
+                <a:ea typeface="Calibri" panose="020F0502020204030204" pitchFamily="34" charset="0"/>
+                <a:cs typeface="Times New Roman" panose="02020603050405020304" pitchFamily="18" charset="0"/>
+              </a:rPr>
+              <a:t>Supported by </a:t>
+            </a:r>
+            <a:r>
+              <a:rPr lang="en-GB" sz="1200" dirty="0" err="1">
+                <a:effectLst/>
+                <a:latin typeface="Calibri" panose="020F0502020204030204" pitchFamily="34" charset="0"/>
+                <a:ea typeface="Calibri" panose="020F0502020204030204" pitchFamily="34" charset="0"/>
+                <a:cs typeface="Times New Roman" panose="02020603050405020304" pitchFamily="18" charset="0"/>
+              </a:rPr>
+              <a:t>Bodjo</a:t>
+            </a:r>
+            <a:r>
+              <a:rPr lang="en-GB" sz="1200" dirty="0">
+                <a:effectLst/>
+                <a:latin typeface="Calibri" panose="020F0502020204030204" pitchFamily="34" charset="0"/>
+                <a:ea typeface="Calibri" panose="020F0502020204030204" pitchFamily="34" charset="0"/>
+                <a:cs typeface="Times New Roman" panose="02020603050405020304" pitchFamily="18" charset="0"/>
+              </a:rPr>
+              <a:t>, Markus, Awa</a:t>
+            </a:r>
+          </a:p>
+          <a:p>
+            <a:endParaRPr lang="en-US" dirty="0"/>
           </a:p>
         </p:txBody>
       </p:sp>
@@ -557,7 +904,7 @@
     </p:spTree>
     <p:extLst>
       <p:ext uri="{BB962C8B-B14F-4D97-AF65-F5344CB8AC3E}">
-        <p14:creationId xmlns:p14="http://schemas.microsoft.com/office/powerpoint/2010/main" val="1133383974"/>
+        <p14:creationId xmlns:p14="http://schemas.microsoft.com/office/powerpoint/2010/main" val="15099233"/>
       </p:ext>
     </p:extLst>
   </p:cSld>
@@ -613,18 +960,74 @@
           <a:p>
             <a:r>
               <a:rPr lang="en-US" dirty="0"/>
-              <a:t>As previous but with upper age limes of 5(male) and 7(female)</a:t>
+              <a:t>Rate = median monthly rate</a:t>
             </a:r>
           </a:p>
           <a:p>
             <a:r>
               <a:rPr lang="en-US" dirty="0"/>
-              <a:t>- Changed from 3 (male) and 5 </a:t>
-            </a:r>
-            <a:r>
-              <a:rPr lang="en-US"/>
-              <a:t>(female)</a:t>
-            </a:r>
+              <a:t>Week is computed weekly rate</a:t>
+            </a:r>
+          </a:p>
+          <a:p>
+            <a:endParaRPr lang="en-US" dirty="0"/>
+          </a:p>
+          <a:p>
+            <a:r>
+              <a:rPr lang="en-US" dirty="0" err="1"/>
+              <a:t>Hdea</a:t>
+            </a:r>
+            <a:r>
+              <a:rPr lang="en-US" dirty="0"/>
+              <a:t> = mortality</a:t>
+            </a:r>
+          </a:p>
+          <a:p>
+            <a:r>
+              <a:rPr lang="en-US" dirty="0"/>
+              <a:t>Hint = intake</a:t>
+            </a:r>
+          </a:p>
+          <a:p>
+            <a:r>
+              <a:rPr lang="en-US" dirty="0"/>
+              <a:t>Hoff = offtake</a:t>
+            </a:r>
+          </a:p>
+          <a:p>
+            <a:r>
+              <a:rPr lang="en-US" dirty="0" err="1"/>
+              <a:t>Hpar</a:t>
+            </a:r>
+            <a:r>
+              <a:rPr lang="en-US" dirty="0"/>
+              <a:t> = parturition risk</a:t>
+            </a:r>
+          </a:p>
+          <a:p>
+            <a:r>
+              <a:rPr lang="en-US" dirty="0" err="1"/>
+              <a:t>Netpro</a:t>
+            </a:r>
+            <a:r>
+              <a:rPr lang="en-US" dirty="0"/>
+              <a:t> = prolificacy (minus stillbirths)</a:t>
+            </a:r>
+          </a:p>
+          <a:p>
+            <a:r>
+              <a:rPr lang="en-US" dirty="0" err="1"/>
+              <a:t>Reprod</a:t>
+            </a:r>
+            <a:r>
+              <a:rPr lang="en-US" dirty="0"/>
+              <a:t> = parturition * </a:t>
+            </a:r>
+            <a:r>
+              <a:rPr lang="en-US" dirty="0" err="1"/>
+              <a:t>prolificac</a:t>
+            </a:r>
+            <a:endParaRPr lang="en-US" dirty="0"/>
           </a:p>
         </p:txBody>
       </p:sp>
@@ -646,6 +1049,218 @@
             <a:fld id="{E7831A90-815D-FC42-8522-216E5D416C20}" type="slidenum">
               <a:rPr lang="en-US" smtClean="0"/>
               <a:t>3</a:t>
+            </a:fld>
+            <a:endParaRPr lang="en-US"/>
+          </a:p>
+        </p:txBody>
+      </p:sp>
+    </p:spTree>
+    <p:extLst>
+      <p:ext uri="{BB962C8B-B14F-4D97-AF65-F5344CB8AC3E}">
+        <p14:creationId xmlns:p14="http://schemas.microsoft.com/office/powerpoint/2010/main" val="1520331078"/>
+      </p:ext>
+    </p:extLst>
+  </p:cSld>
+  <p:clrMapOvr>
+    <a:masterClrMapping/>
+  </p:clrMapOvr>
+</p:notes>
+</file>
+
+<file path=ppt/notesSlides/notesSlide3.xml><?xml version="1.0" encoding="utf-8"?>
+<p:notes xmlns:a="http://schemas.openxmlformats.org/drawingml/2006/main" xmlns:r="http://schemas.openxmlformats.org/officeDocument/2006/relationships" xmlns:p="http://schemas.openxmlformats.org/presentationml/2006/main">
+  <p:cSld>
+    <p:spTree>
+      <p:nvGrpSpPr>
+        <p:cNvPr id="1" name=""/>
+        <p:cNvGrpSpPr/>
+        <p:nvPr/>
+      </p:nvGrpSpPr>
+      <p:grpSpPr>
+        <a:xfrm>
+          <a:off x="0" y="0"/>
+          <a:ext cx="0" cy="0"/>
+          <a:chOff x="0" y="0"/>
+          <a:chExt cx="0" cy="0"/>
+        </a:xfrm>
+      </p:grpSpPr>
+      <p:sp>
+        <p:nvSpPr>
+          <p:cNvPr id="2" name="Slide Image Placeholder 1"/>
+          <p:cNvSpPr>
+            <a:spLocks noGrp="1" noRot="1" noChangeAspect="1"/>
+          </p:cNvSpPr>
+          <p:nvPr>
+            <p:ph type="sldImg"/>
+          </p:nvPr>
+        </p:nvSpPr>
+        <p:spPr/>
+      </p:sp>
+      <p:sp>
+        <p:nvSpPr>
+          <p:cNvPr id="3" name="Notes Placeholder 2"/>
+          <p:cNvSpPr>
+            <a:spLocks noGrp="1"/>
+          </p:cNvSpPr>
+          <p:nvPr>
+            <p:ph type="body" idx="1"/>
+          </p:nvPr>
+        </p:nvSpPr>
+        <p:spPr/>
+        <p:txBody>
+          <a:bodyPr/>
+          <a:lstStyle/>
+          <a:p>
+            <a:r>
+              <a:rPr lang="en-US" dirty="0"/>
+              <a:t>BAOBAB data</a:t>
+            </a:r>
+          </a:p>
+          <a:p>
+            <a:r>
+              <a:rPr lang="en-US" dirty="0"/>
+              <a:t>Pop size: 1700 </a:t>
+            </a:r>
+          </a:p>
+          <a:p>
+            <a:r>
+              <a:rPr lang="en-US" dirty="0"/>
+              <a:t>Max age F: 7y, M: 5y</a:t>
+            </a:r>
+          </a:p>
+          <a:p>
+            <a:r>
+              <a:rPr lang="en-US"/>
+              <a:t>Age cats: 4m/6m/12m/18m/18m+</a:t>
+            </a:r>
+            <a:endParaRPr lang="en-US" dirty="0"/>
+          </a:p>
+          <a:p>
+            <a:endParaRPr lang="en-US" dirty="0"/>
+          </a:p>
+          <a:p>
+            <a:r>
+              <a:rPr lang="en-US" dirty="0"/>
+              <a:t>No transmission</a:t>
+            </a:r>
+          </a:p>
+        </p:txBody>
+      </p:sp>
+      <p:sp>
+        <p:nvSpPr>
+          <p:cNvPr id="4" name="Slide Number Placeholder 3"/>
+          <p:cNvSpPr>
+            <a:spLocks noGrp="1"/>
+          </p:cNvSpPr>
+          <p:nvPr>
+            <p:ph type="sldNum" sz="quarter" idx="5"/>
+          </p:nvPr>
+        </p:nvSpPr>
+        <p:spPr/>
+        <p:txBody>
+          <a:bodyPr/>
+          <a:lstStyle/>
+          <a:p>
+            <a:fld id="{E7831A90-815D-FC42-8522-216E5D416C20}" type="slidenum">
+              <a:rPr lang="en-US" smtClean="0"/>
+              <a:t>4</a:t>
+            </a:fld>
+            <a:endParaRPr lang="en-US"/>
+          </a:p>
+        </p:txBody>
+      </p:sp>
+    </p:spTree>
+    <p:extLst>
+      <p:ext uri="{BB962C8B-B14F-4D97-AF65-F5344CB8AC3E}">
+        <p14:creationId xmlns:p14="http://schemas.microsoft.com/office/powerpoint/2010/main" val="1133383974"/>
+      </p:ext>
+    </p:extLst>
+  </p:cSld>
+  <p:clrMapOvr>
+    <a:masterClrMapping/>
+  </p:clrMapOvr>
+</p:notes>
+</file>
+
+<file path=ppt/notesSlides/notesSlide4.xml><?xml version="1.0" encoding="utf-8"?>
+<p:notes xmlns:a="http://schemas.openxmlformats.org/drawingml/2006/main" xmlns:r="http://schemas.openxmlformats.org/officeDocument/2006/relationships" xmlns:p="http://schemas.openxmlformats.org/presentationml/2006/main">
+  <p:cSld>
+    <p:spTree>
+      <p:nvGrpSpPr>
+        <p:cNvPr id="1" name=""/>
+        <p:cNvGrpSpPr/>
+        <p:nvPr/>
+      </p:nvGrpSpPr>
+      <p:grpSpPr>
+        <a:xfrm>
+          <a:off x="0" y="0"/>
+          <a:ext cx="0" cy="0"/>
+          <a:chOff x="0" y="0"/>
+          <a:chExt cx="0" cy="0"/>
+        </a:xfrm>
+      </p:grpSpPr>
+      <p:sp>
+        <p:nvSpPr>
+          <p:cNvPr id="2" name="Slide Image Placeholder 1"/>
+          <p:cNvSpPr>
+            <a:spLocks noGrp="1" noRot="1" noChangeAspect="1"/>
+          </p:cNvSpPr>
+          <p:nvPr>
+            <p:ph type="sldImg"/>
+          </p:nvPr>
+        </p:nvSpPr>
+        <p:spPr/>
+      </p:sp>
+      <p:sp>
+        <p:nvSpPr>
+          <p:cNvPr id="3" name="Notes Placeholder 2"/>
+          <p:cNvSpPr>
+            <a:spLocks noGrp="1"/>
+          </p:cNvSpPr>
+          <p:nvPr>
+            <p:ph type="body" idx="1"/>
+          </p:nvPr>
+        </p:nvSpPr>
+        <p:spPr/>
+        <p:txBody>
+          <a:bodyPr/>
+          <a:lstStyle/>
+          <a:p>
+            <a:r>
+              <a:rPr lang="en-US" dirty="0"/>
+              <a:t>As previous but with upper age limes of 5(male) and 7(female)</a:t>
+            </a:r>
+          </a:p>
+          <a:p>
+            <a:r>
+              <a:rPr lang="en-US" dirty="0"/>
+              <a:t>- Changed from 3 (male) and 5 </a:t>
+            </a:r>
+            <a:r>
+              <a:rPr lang="en-US"/>
+              <a:t>(female)</a:t>
+            </a:r>
+          </a:p>
+        </p:txBody>
+      </p:sp>
+      <p:sp>
+        <p:nvSpPr>
+          <p:cNvPr id="4" name="Slide Number Placeholder 3"/>
+          <p:cNvSpPr>
+            <a:spLocks noGrp="1"/>
+          </p:cNvSpPr>
+          <p:nvPr>
+            <p:ph type="sldNum" sz="quarter" idx="5"/>
+          </p:nvPr>
+        </p:nvSpPr>
+        <p:spPr/>
+        <p:txBody>
+          <a:bodyPr/>
+          <a:lstStyle/>
+          <a:p>
+            <a:fld id="{E7831A90-815D-FC42-8522-216E5D416C20}" type="slidenum">
+              <a:rPr lang="en-US" smtClean="0"/>
+              <a:t>5</a:t>
             </a:fld>
             <a:endParaRPr lang="en-US"/>
           </a:p>
@@ -813,7 +1428,7 @@
           <a:p>
             <a:fld id="{17EE346A-1225-314F-8E90-18293479AF17}" type="datetimeFigureOut">
               <a:rPr lang="en-US" smtClean="0"/>
-              <a:t>2/9/23</a:t>
+              <a:t>2/27/23</a:t>
             </a:fld>
             <a:endParaRPr lang="en-US"/>
           </a:p>
@@ -1013,7 +1628,7 @@
           <a:p>
             <a:fld id="{17EE346A-1225-314F-8E90-18293479AF17}" type="datetimeFigureOut">
               <a:rPr lang="en-US" smtClean="0"/>
-              <a:t>2/9/23</a:t>
+              <a:t>2/27/23</a:t>
             </a:fld>
             <a:endParaRPr lang="en-US"/>
           </a:p>
@@ -1223,7 +1838,7 @@
           <a:p>
             <a:fld id="{17EE346A-1225-314F-8E90-18293479AF17}" type="datetimeFigureOut">
               <a:rPr lang="en-US" smtClean="0"/>
-              <a:t>2/9/23</a:t>
+              <a:t>2/27/23</a:t>
             </a:fld>
             <a:endParaRPr lang="en-US"/>
           </a:p>
@@ -1423,7 +2038,7 @@
           <a:p>
             <a:fld id="{17EE346A-1225-314F-8E90-18293479AF17}" type="datetimeFigureOut">
               <a:rPr lang="en-US" smtClean="0"/>
-              <a:t>2/9/23</a:t>
+              <a:t>2/27/23</a:t>
             </a:fld>
             <a:endParaRPr lang="en-US"/>
           </a:p>
@@ -1699,7 +2314,7 @@
           <a:p>
             <a:fld id="{17EE346A-1225-314F-8E90-18293479AF17}" type="datetimeFigureOut">
               <a:rPr lang="en-US" smtClean="0"/>
-              <a:t>2/9/23</a:t>
+              <a:t>2/27/23</a:t>
             </a:fld>
             <a:endParaRPr lang="en-US"/>
           </a:p>
@@ -1967,7 +2582,7 @@
           <a:p>
             <a:fld id="{17EE346A-1225-314F-8E90-18293479AF17}" type="datetimeFigureOut">
               <a:rPr lang="en-US" smtClean="0"/>
-              <a:t>2/9/23</a:t>
+              <a:t>2/27/23</a:t>
             </a:fld>
             <a:endParaRPr lang="en-US"/>
           </a:p>
@@ -2382,7 +2997,7 @@
           <a:p>
             <a:fld id="{17EE346A-1225-314F-8E90-18293479AF17}" type="datetimeFigureOut">
               <a:rPr lang="en-US" smtClean="0"/>
-              <a:t>2/9/23</a:t>
+              <a:t>2/27/23</a:t>
             </a:fld>
             <a:endParaRPr lang="en-US"/>
           </a:p>
@@ -2524,7 +3139,7 @@
           <a:p>
             <a:fld id="{17EE346A-1225-314F-8E90-18293479AF17}" type="datetimeFigureOut">
               <a:rPr lang="en-US" smtClean="0"/>
-              <a:t>2/9/23</a:t>
+              <a:t>2/27/23</a:t>
             </a:fld>
             <a:endParaRPr lang="en-US"/>
           </a:p>
@@ -2637,7 +3252,7 @@
           <a:p>
             <a:fld id="{17EE346A-1225-314F-8E90-18293479AF17}" type="datetimeFigureOut">
               <a:rPr lang="en-US" smtClean="0"/>
-              <a:t>2/9/23</a:t>
+              <a:t>2/27/23</a:t>
             </a:fld>
             <a:endParaRPr lang="en-US"/>
           </a:p>
@@ -2950,7 +3565,7 @@
           <a:p>
             <a:fld id="{17EE346A-1225-314F-8E90-18293479AF17}" type="datetimeFigureOut">
               <a:rPr lang="en-US" smtClean="0"/>
-              <a:t>2/9/23</a:t>
+              <a:t>2/27/23</a:t>
             </a:fld>
             <a:endParaRPr lang="en-US"/>
           </a:p>
@@ -3239,7 +3854,7 @@
           <a:p>
             <a:fld id="{17EE346A-1225-314F-8E90-18293479AF17}" type="datetimeFigureOut">
               <a:rPr lang="en-US" smtClean="0"/>
-              <a:t>2/9/23</a:t>
+              <a:t>2/27/23</a:t>
             </a:fld>
             <a:endParaRPr lang="en-US"/>
           </a:p>
@@ -3482,7 +4097,7 @@
           <a:p>
             <a:fld id="{17EE346A-1225-314F-8E90-18293479AF17}" type="datetimeFigureOut">
               <a:rPr lang="en-US" smtClean="0"/>
-              <a:t>2/9/23</a:t>
+              <a:t>2/27/23</a:t>
             </a:fld>
             <a:endParaRPr lang="en-US"/>
           </a:p>
@@ -3990,6 +4605,526 @@
           <a:chExt cx="0" cy="0"/>
         </a:xfrm>
       </p:grpSpPr>
+      <p:sp>
+        <p:nvSpPr>
+          <p:cNvPr id="2" name="Title 1">
+            <a:extLst>
+              <a:ext uri="{FF2B5EF4-FFF2-40B4-BE49-F238E27FC236}">
+                <a16:creationId xmlns:a16="http://schemas.microsoft.com/office/drawing/2014/main" id="{1B6688C9-0601-6784-CCC2-33D20AABBF9E}"/>
+              </a:ext>
+            </a:extLst>
+          </p:cNvPr>
+          <p:cNvSpPr>
+            <a:spLocks noGrp="1"/>
+          </p:cNvSpPr>
+          <p:nvPr>
+            <p:ph type="title"/>
+          </p:nvPr>
+        </p:nvSpPr>
+        <p:spPr>
+          <a:xfrm>
+            <a:off x="838199" y="291090"/>
+            <a:ext cx="10515599" cy="932688"/>
+          </a:xfrm>
+        </p:spPr>
+        <p:txBody>
+          <a:bodyPr vert="horz" lIns="91440" tIns="45720" rIns="91440" bIns="45720" rtlCol="0" anchor="b">
+            <a:normAutofit/>
+          </a:bodyPr>
+          <a:lstStyle/>
+          <a:p>
+            <a:pPr algn="ctr"/>
+            <a:r>
+              <a:rPr lang="en-US" sz="5400" kern="1200">
+                <a:solidFill>
+                  <a:schemeClr val="tx1"/>
+                </a:solidFill>
+                <a:latin typeface="+mj-lt"/>
+                <a:ea typeface="+mj-ea"/>
+                <a:cs typeface="+mj-cs"/>
+              </a:rPr>
+              <a:t>Immune decay</a:t>
+            </a:r>
+          </a:p>
+        </p:txBody>
+      </p:sp>
+      <p:pic>
+        <p:nvPicPr>
+          <p:cNvPr id="4" name="Content Placeholder 3" descr="Chart, line chart&#10;&#10;Description automatically generated">
+            <a:extLst>
+              <a:ext uri="{FF2B5EF4-FFF2-40B4-BE49-F238E27FC236}">
+                <a16:creationId xmlns:a16="http://schemas.microsoft.com/office/drawing/2014/main" id="{EBE65530-7438-00EE-FEC1-EFCFF2A8FF1E}"/>
+              </a:ext>
+            </a:extLst>
+          </p:cNvPr>
+          <p:cNvPicPr>
+            <a:picLocks noGrp="1" noChangeAspect="1"/>
+          </p:cNvPicPr>
+          <p:nvPr>
+            <p:ph idx="1"/>
+          </p:nvPr>
+        </p:nvPicPr>
+        <p:blipFill>
+          <a:blip r:embed="rId3"/>
+          <a:stretch>
+            <a:fillRect/>
+          </a:stretch>
+        </p:blipFill>
+        <p:spPr>
+          <a:xfrm>
+            <a:off x="261439" y="2001652"/>
+            <a:ext cx="5723421" cy="3362510"/>
+          </a:xfrm>
+          <a:prstGeom prst="rect">
+            <a:avLst/>
+          </a:prstGeom>
+        </p:spPr>
+      </p:pic>
+      <p:pic>
+        <p:nvPicPr>
+          <p:cNvPr id="5" name="Picture 4" descr="Chart, line chart&#10;&#10;Description automatically generated">
+            <a:extLst>
+              <a:ext uri="{FF2B5EF4-FFF2-40B4-BE49-F238E27FC236}">
+                <a16:creationId xmlns:a16="http://schemas.microsoft.com/office/drawing/2014/main" id="{9E909BD6-7F82-25B9-EF20-6615FE3841E7}"/>
+              </a:ext>
+            </a:extLst>
+          </p:cNvPr>
+          <p:cNvPicPr>
+            <a:picLocks noChangeAspect="1"/>
+          </p:cNvPicPr>
+          <p:nvPr/>
+        </p:nvPicPr>
+        <p:blipFill>
+          <a:blip r:embed="rId4"/>
+          <a:stretch>
+            <a:fillRect/>
+          </a:stretch>
+        </p:blipFill>
+        <p:spPr>
+          <a:xfrm>
+            <a:off x="6207142" y="1893887"/>
+            <a:ext cx="5316566" cy="3592513"/>
+          </a:xfrm>
+          <a:prstGeom prst="rect">
+            <a:avLst/>
+          </a:prstGeom>
+        </p:spPr>
+      </p:pic>
+      <p:cxnSp>
+        <p:nvCxnSpPr>
+          <p:cNvPr id="7" name="Straight Connector 6">
+            <a:extLst>
+              <a:ext uri="{FF2B5EF4-FFF2-40B4-BE49-F238E27FC236}">
+                <a16:creationId xmlns:a16="http://schemas.microsoft.com/office/drawing/2014/main" id="{D8AC02E2-2CC6-0C2F-E225-58A9B58ACE30}"/>
+              </a:ext>
+            </a:extLst>
+          </p:cNvPr>
+          <p:cNvCxnSpPr/>
+          <p:nvPr/>
+        </p:nvCxnSpPr>
+        <p:spPr>
+          <a:xfrm>
+            <a:off x="10425918" y="1223778"/>
+            <a:ext cx="0" cy="4662672"/>
+          </a:xfrm>
+          <a:prstGeom prst="line">
+            <a:avLst/>
+          </a:prstGeom>
+          <a:ln w="38100">
+            <a:prstDash val="dash"/>
+          </a:ln>
+        </p:spPr>
+        <p:style>
+          <a:lnRef idx="3">
+            <a:schemeClr val="accent4"/>
+          </a:lnRef>
+          <a:fillRef idx="0">
+            <a:schemeClr val="accent4"/>
+          </a:fillRef>
+          <a:effectRef idx="2">
+            <a:schemeClr val="accent4"/>
+          </a:effectRef>
+          <a:fontRef idx="minor">
+            <a:schemeClr val="tx1"/>
+          </a:fontRef>
+        </p:style>
+      </p:cxnSp>
+      <p:cxnSp>
+        <p:nvCxnSpPr>
+          <p:cNvPr id="8" name="Straight Connector 7">
+            <a:extLst>
+              <a:ext uri="{FF2B5EF4-FFF2-40B4-BE49-F238E27FC236}">
+                <a16:creationId xmlns:a16="http://schemas.microsoft.com/office/drawing/2014/main" id="{F4933424-D00D-8E14-5B3C-1F727FE5C45D}"/>
+              </a:ext>
+            </a:extLst>
+          </p:cNvPr>
+          <p:cNvCxnSpPr/>
+          <p:nvPr/>
+        </p:nvCxnSpPr>
+        <p:spPr>
+          <a:xfrm>
+            <a:off x="3417862" y="1097664"/>
+            <a:ext cx="0" cy="4662672"/>
+          </a:xfrm>
+          <a:prstGeom prst="line">
+            <a:avLst/>
+          </a:prstGeom>
+          <a:ln w="38100">
+            <a:prstDash val="dash"/>
+          </a:ln>
+        </p:spPr>
+        <p:style>
+          <a:lnRef idx="3">
+            <a:schemeClr val="accent4"/>
+          </a:lnRef>
+          <a:fillRef idx="0">
+            <a:schemeClr val="accent4"/>
+          </a:fillRef>
+          <a:effectRef idx="2">
+            <a:schemeClr val="accent4"/>
+          </a:effectRef>
+          <a:fontRef idx="minor">
+            <a:schemeClr val="tx1"/>
+          </a:fontRef>
+        </p:style>
+      </p:cxnSp>
+      <p:sp>
+        <p:nvSpPr>
+          <p:cNvPr id="10" name="TextBox 9">
+            <a:extLst>
+              <a:ext uri="{FF2B5EF4-FFF2-40B4-BE49-F238E27FC236}">
+                <a16:creationId xmlns:a16="http://schemas.microsoft.com/office/drawing/2014/main" id="{4298E43C-1FBE-622C-E185-AB0D6DD6F52A}"/>
+              </a:ext>
+            </a:extLst>
+          </p:cNvPr>
+          <p:cNvSpPr txBox="1"/>
+          <p:nvPr/>
+        </p:nvSpPr>
+        <p:spPr>
+          <a:xfrm>
+            <a:off x="3123149" y="2030451"/>
+            <a:ext cx="3231929" cy="646331"/>
+          </a:xfrm>
+          <a:prstGeom prst="rect">
+            <a:avLst/>
+          </a:prstGeom>
+          <a:noFill/>
+        </p:spPr>
+        <p:txBody>
+          <a:bodyPr wrap="square">
+            <a:spAutoFit/>
+          </a:bodyPr>
+          <a:lstStyle/>
+          <a:p>
+            <a:pPr marL="342900" lvl="0" indent="-342900">
+              <a:buFont typeface="Calibri" panose="020F0502020204030204" pitchFamily="34" charset="0"/>
+              <a:buChar char="-"/>
+            </a:pPr>
+            <a:r>
+              <a:rPr lang="en-GB" sz="1200" dirty="0">
+                <a:effectLst/>
+                <a:latin typeface="Calibri" panose="020F0502020204030204" pitchFamily="34" charset="0"/>
+                <a:ea typeface="Calibri" panose="020F0502020204030204" pitchFamily="34" charset="0"/>
+                <a:cs typeface="Times New Roman" panose="02020603050405020304" pitchFamily="18" charset="0"/>
+              </a:rPr>
+              <a:t>Set maternal immunity to last until 4</a:t>
+            </a:r>
+            <a:r>
+              <a:rPr lang="en-GB" sz="1200" baseline="30000" dirty="0">
+                <a:effectLst/>
+                <a:latin typeface="Calibri" panose="020F0502020204030204" pitchFamily="34" charset="0"/>
+                <a:ea typeface="Calibri" panose="020F0502020204030204" pitchFamily="34" charset="0"/>
+                <a:cs typeface="Times New Roman" panose="02020603050405020304" pitchFamily="18" charset="0"/>
+              </a:rPr>
+              <a:t>th</a:t>
+            </a:r>
+            <a:r>
+              <a:rPr lang="en-GB" sz="1200" dirty="0">
+                <a:effectLst/>
+                <a:latin typeface="Calibri" panose="020F0502020204030204" pitchFamily="34" charset="0"/>
+                <a:ea typeface="Calibri" panose="020F0502020204030204" pitchFamily="34" charset="0"/>
+                <a:cs typeface="Times New Roman" panose="02020603050405020304" pitchFamily="18" charset="0"/>
+              </a:rPr>
+              <a:t> month (week 17 = 0 immunity)</a:t>
+            </a:r>
+          </a:p>
+          <a:p>
+            <a:pPr marL="742950" lvl="1" indent="-285750">
+              <a:buFont typeface="Courier New" panose="02070309020205020404" pitchFamily="49" charset="0"/>
+              <a:buChar char="o"/>
+            </a:pPr>
+            <a:r>
+              <a:rPr lang="en-GB" sz="1200" dirty="0">
+                <a:effectLst/>
+                <a:latin typeface="Calibri" panose="020F0502020204030204" pitchFamily="34" charset="0"/>
+                <a:ea typeface="Calibri" panose="020F0502020204030204" pitchFamily="34" charset="0"/>
+                <a:cs typeface="Times New Roman" panose="02020603050405020304" pitchFamily="18" charset="0"/>
+              </a:rPr>
+              <a:t>Supported by </a:t>
+            </a:r>
+            <a:r>
+              <a:rPr lang="en-GB" sz="1200" dirty="0" err="1">
+                <a:effectLst/>
+                <a:latin typeface="Calibri" panose="020F0502020204030204" pitchFamily="34" charset="0"/>
+                <a:ea typeface="Calibri" panose="020F0502020204030204" pitchFamily="34" charset="0"/>
+                <a:cs typeface="Times New Roman" panose="02020603050405020304" pitchFamily="18" charset="0"/>
+              </a:rPr>
+              <a:t>Bodjo</a:t>
+            </a:r>
+            <a:r>
+              <a:rPr lang="en-GB" sz="1200" dirty="0">
+                <a:effectLst/>
+                <a:latin typeface="Calibri" panose="020F0502020204030204" pitchFamily="34" charset="0"/>
+                <a:ea typeface="Calibri" panose="020F0502020204030204" pitchFamily="34" charset="0"/>
+                <a:cs typeface="Times New Roman" panose="02020603050405020304" pitchFamily="18" charset="0"/>
+              </a:rPr>
+              <a:t>, Markus, Awa</a:t>
+            </a:r>
+          </a:p>
+        </p:txBody>
+      </p:sp>
+    </p:spTree>
+    <p:extLst>
+      <p:ext uri="{BB962C8B-B14F-4D97-AF65-F5344CB8AC3E}">
+        <p14:creationId xmlns:p14="http://schemas.microsoft.com/office/powerpoint/2010/main" val="1361513349"/>
+      </p:ext>
+    </p:extLst>
+  </p:cSld>
+  <p:clrMapOvr>
+    <a:masterClrMapping/>
+  </p:clrMapOvr>
+</p:sld>
+</file>
+
+<file path=ppt/slides/slide3.xml><?xml version="1.0" encoding="utf-8"?>
+<p:sld xmlns:a="http://schemas.openxmlformats.org/drawingml/2006/main" xmlns:r="http://schemas.openxmlformats.org/officeDocument/2006/relationships" xmlns:p="http://schemas.openxmlformats.org/presentationml/2006/main">
+  <p:cSld>
+    <p:spTree>
+      <p:nvGrpSpPr>
+        <p:cNvPr id="1" name=""/>
+        <p:cNvGrpSpPr/>
+        <p:nvPr/>
+      </p:nvGrpSpPr>
+      <p:grpSpPr>
+        <a:xfrm>
+          <a:off x="0" y="0"/>
+          <a:ext cx="0" cy="0"/>
+          <a:chOff x="0" y="0"/>
+          <a:chExt cx="0" cy="0"/>
+        </a:xfrm>
+      </p:grpSpPr>
+      <p:sp>
+        <p:nvSpPr>
+          <p:cNvPr id="2" name="Title 1">
+            <a:extLst>
+              <a:ext uri="{FF2B5EF4-FFF2-40B4-BE49-F238E27FC236}">
+                <a16:creationId xmlns:a16="http://schemas.microsoft.com/office/drawing/2014/main" id="{886AA6A4-35E3-0AA1-51AC-149697AD0686}"/>
+              </a:ext>
+            </a:extLst>
+          </p:cNvPr>
+          <p:cNvSpPr>
+            <a:spLocks noGrp="1"/>
+          </p:cNvSpPr>
+          <p:nvPr>
+            <p:ph type="title"/>
+          </p:nvPr>
+        </p:nvSpPr>
+        <p:spPr/>
+        <p:txBody>
+          <a:bodyPr/>
+          <a:lstStyle/>
+          <a:p>
+            <a:r>
+              <a:rPr lang="en-US" dirty="0"/>
+              <a:t>BAOBAB Test</a:t>
+            </a:r>
+          </a:p>
+        </p:txBody>
+      </p:sp>
+      <p:sp>
+        <p:nvSpPr>
+          <p:cNvPr id="5" name="TextBox 4">
+            <a:extLst>
+              <a:ext uri="{FF2B5EF4-FFF2-40B4-BE49-F238E27FC236}">
+                <a16:creationId xmlns:a16="http://schemas.microsoft.com/office/drawing/2014/main" id="{BBF75125-788D-4D03-EC0A-A3C284BEC4EF}"/>
+              </a:ext>
+            </a:extLst>
+          </p:cNvPr>
+          <p:cNvSpPr txBox="1"/>
+          <p:nvPr/>
+        </p:nvSpPr>
+        <p:spPr>
+          <a:xfrm>
+            <a:off x="838200" y="1690688"/>
+            <a:ext cx="7389056" cy="2308324"/>
+          </a:xfrm>
+          <a:prstGeom prst="rect">
+            <a:avLst/>
+          </a:prstGeom>
+          <a:noFill/>
+        </p:spPr>
+        <p:txBody>
+          <a:bodyPr wrap="square">
+            <a:spAutoFit/>
+          </a:bodyPr>
+          <a:lstStyle/>
+          <a:p>
+            <a:r>
+              <a:rPr lang="en-US" dirty="0"/>
+              <a:t> parameter	rate 		</a:t>
+            </a:r>
+            <a:r>
+              <a:rPr lang="en-US" dirty="0" err="1"/>
+              <a:t>rate_wk</a:t>
+            </a:r>
+            <a:endParaRPr lang="en-US" dirty="0"/>
+          </a:p>
+          <a:p>
+            <a:r>
+              <a:rPr lang="en-US" dirty="0"/>
+              <a:t>  &lt;</a:t>
+            </a:r>
+            <a:r>
+              <a:rPr lang="en-US" dirty="0" err="1"/>
+              <a:t>fct</a:t>
+            </a:r>
+            <a:r>
+              <a:rPr lang="en-US" dirty="0"/>
+              <a:t>&gt;      		&lt;</a:t>
+            </a:r>
+            <a:r>
+              <a:rPr lang="en-US" dirty="0" err="1"/>
+              <a:t>dbl</a:t>
+            </a:r>
+            <a:r>
+              <a:rPr lang="en-US" dirty="0"/>
+              <a:t>&gt;   		&lt;</a:t>
+            </a:r>
+            <a:r>
+              <a:rPr lang="en-US" dirty="0" err="1"/>
+              <a:t>dbl</a:t>
+            </a:r>
+            <a:r>
+              <a:rPr lang="en-US" dirty="0"/>
+              <a:t>&gt;</a:t>
+            </a:r>
+          </a:p>
+          <a:p>
+            <a:r>
+              <a:rPr lang="en-US" dirty="0"/>
+              <a:t>1 </a:t>
+            </a:r>
+            <a:r>
+              <a:rPr lang="en-US" dirty="0" err="1"/>
+              <a:t>hdea</a:t>
+            </a:r>
+            <a:r>
+              <a:rPr lang="en-US" dirty="0"/>
+              <a:t>      	0.0234 		0.00537</a:t>
+            </a:r>
+          </a:p>
+          <a:p>
+            <a:r>
+              <a:rPr lang="en-US" dirty="0"/>
+              <a:t>2 hint      		0.0527 		0.0121 </a:t>
+            </a:r>
+          </a:p>
+          <a:p>
+            <a:r>
+              <a:rPr lang="en-US" dirty="0"/>
+              <a:t>3 </a:t>
+            </a:r>
+            <a:r>
+              <a:rPr lang="en-US" dirty="0" err="1"/>
+              <a:t>hoff</a:t>
+            </a:r>
+            <a:r>
+              <a:rPr lang="en-US" dirty="0"/>
+              <a:t>      		0.0527 		0.0121 </a:t>
+            </a:r>
+          </a:p>
+          <a:p>
+            <a:r>
+              <a:rPr lang="en-US" dirty="0"/>
+              <a:t>4 </a:t>
+            </a:r>
+            <a:r>
+              <a:rPr lang="en-US" dirty="0" err="1"/>
+              <a:t>hpar</a:t>
+            </a:r>
+            <a:r>
+              <a:rPr lang="en-US" dirty="0"/>
+              <a:t>      		0.0680 		0.0157 </a:t>
+            </a:r>
+          </a:p>
+          <a:p>
+            <a:r>
+              <a:rPr lang="en-US" dirty="0"/>
+              <a:t>5 </a:t>
+            </a:r>
+            <a:r>
+              <a:rPr lang="en-US" dirty="0" err="1"/>
+              <a:t>netpro</a:t>
+            </a:r>
+            <a:r>
+              <a:rPr lang="en-US" dirty="0"/>
+              <a:t>    	1.48   		0.341  </a:t>
+            </a:r>
+          </a:p>
+          <a:p>
+            <a:r>
+              <a:rPr lang="en-US" dirty="0"/>
+              <a:t>6 </a:t>
+            </a:r>
+            <a:r>
+              <a:rPr lang="en-US" dirty="0" err="1"/>
+              <a:t>reprod</a:t>
+            </a:r>
+            <a:r>
+              <a:rPr lang="en-US" dirty="0"/>
+              <a:t>    	0.0997 		0.0230 </a:t>
+            </a:r>
+          </a:p>
+        </p:txBody>
+      </p:sp>
+    </p:spTree>
+    <p:extLst>
+      <p:ext uri="{BB962C8B-B14F-4D97-AF65-F5344CB8AC3E}">
+        <p14:creationId xmlns:p14="http://schemas.microsoft.com/office/powerpoint/2010/main" val="3929642493"/>
+      </p:ext>
+    </p:extLst>
+  </p:cSld>
+  <p:clrMapOvr>
+    <a:masterClrMapping/>
+  </p:clrMapOvr>
+</p:sld>
+</file>
+
+<file path=ppt/slides/slide4.xml><?xml version="1.0" encoding="utf-8"?>
+<p:sld xmlns:a="http://schemas.openxmlformats.org/drawingml/2006/main" xmlns:r="http://schemas.openxmlformats.org/officeDocument/2006/relationships" xmlns:p="http://schemas.openxmlformats.org/presentationml/2006/main">
+  <p:cSld>
+    <p:bg>
+      <p:bgPr>
+        <a:solidFill>
+          <a:schemeClr val="bg1"/>
+        </a:solidFill>
+        <a:effectLst/>
+      </p:bgPr>
+    </p:bg>
+    <p:spTree>
+      <p:nvGrpSpPr>
+        <p:cNvPr id="1" name=""/>
+        <p:cNvGrpSpPr/>
+        <p:nvPr/>
+      </p:nvGrpSpPr>
+      <p:grpSpPr>
+        <a:xfrm>
+          <a:off x="0" y="0"/>
+          <a:ext cx="0" cy="0"/>
+          <a:chOff x="0" y="0"/>
+          <a:chExt cx="0" cy="0"/>
+        </a:xfrm>
+      </p:grpSpPr>
       <p:pic>
         <p:nvPicPr>
           <p:cNvPr id="5" name="Picture 4">
@@ -4321,7 +5456,7 @@
 </p:sld>
 </file>
 
-<file path=ppt/slides/slide3.xml><?xml version="1.0" encoding="utf-8"?>
+<file path=ppt/slides/slide5.xml><?xml version="1.0" encoding="utf-8"?>
 <p:sld xmlns:a="http://schemas.openxmlformats.org/drawingml/2006/main" xmlns:r="http://schemas.openxmlformats.org/officeDocument/2006/relationships" xmlns:p="http://schemas.openxmlformats.org/presentationml/2006/main">
   <p:cSld>
     <p:bg>
@@ -4668,6 +5803,201 @@
     <p:extLst>
       <p:ext uri="{BB962C8B-B14F-4D97-AF65-F5344CB8AC3E}">
         <p14:creationId xmlns:p14="http://schemas.microsoft.com/office/powerpoint/2010/main" val="419127042"/>
+      </p:ext>
+    </p:extLst>
+  </p:cSld>
+  <p:clrMapOvr>
+    <a:masterClrMapping/>
+  </p:clrMapOvr>
+</p:sld>
+</file>
+
+<file path=ppt/slides/slide6.xml><?xml version="1.0" encoding="utf-8"?>
+<p:sld xmlns:a="http://schemas.openxmlformats.org/drawingml/2006/main" xmlns:r="http://schemas.openxmlformats.org/officeDocument/2006/relationships" xmlns:p="http://schemas.openxmlformats.org/presentationml/2006/main">
+  <p:cSld>
+    <p:spTree>
+      <p:nvGrpSpPr>
+        <p:cNvPr id="1" name=""/>
+        <p:cNvGrpSpPr/>
+        <p:nvPr/>
+      </p:nvGrpSpPr>
+      <p:grpSpPr>
+        <a:xfrm>
+          <a:off x="0" y="0"/>
+          <a:ext cx="0" cy="0"/>
+          <a:chOff x="0" y="0"/>
+          <a:chExt cx="0" cy="0"/>
+        </a:xfrm>
+      </p:grpSpPr>
+      <p:sp>
+        <p:nvSpPr>
+          <p:cNvPr id="3" name="TextBox 2">
+            <a:extLst>
+              <a:ext uri="{FF2B5EF4-FFF2-40B4-BE49-F238E27FC236}">
+                <a16:creationId xmlns:a16="http://schemas.microsoft.com/office/drawing/2014/main" id="{2CEAF43A-3C94-8B4E-2E3A-71E8CE67926E}"/>
+              </a:ext>
+            </a:extLst>
+          </p:cNvPr>
+          <p:cNvSpPr txBox="1"/>
+          <p:nvPr/>
+        </p:nvSpPr>
+        <p:spPr>
+          <a:xfrm>
+            <a:off x="3049172" y="2709242"/>
+            <a:ext cx="6098344" cy="1446550"/>
+          </a:xfrm>
+          <a:prstGeom prst="rect">
+            <a:avLst/>
+          </a:prstGeom>
+          <a:noFill/>
+        </p:spPr>
+        <p:txBody>
+          <a:bodyPr wrap="square">
+            <a:spAutoFit/>
+          </a:bodyPr>
+          <a:lstStyle/>
+          <a:p>
+            <a:pPr rtl="0" fontAlgn="ctr">
+              <a:spcBef>
+                <a:spcPts val="0"/>
+              </a:spcBef>
+              <a:spcAft>
+                <a:spcPts val="0"/>
+              </a:spcAft>
+              <a:buFont typeface="Courier New" panose="02070309020205020404" pitchFamily="49" charset="0"/>
+              <a:buChar char="o"/>
+            </a:pPr>
+            <a:r>
+              <a:rPr lang="en-GB" sz="1100" dirty="0">
+                <a:effectLst/>
+                <a:latin typeface="Calibri" panose="020F0502020204030204" pitchFamily="34" charset="0"/>
+              </a:rPr>
+              <a:t>Developments:</a:t>
+            </a:r>
+          </a:p>
+          <a:p>
+            <a:pPr marL="742950" lvl="1" indent="-285750" rtl="0" fontAlgn="ctr">
+              <a:spcBef>
+                <a:spcPts val="0"/>
+              </a:spcBef>
+              <a:spcAft>
+                <a:spcPts val="0"/>
+              </a:spcAft>
+              <a:buFont typeface="Arial" panose="020B0604020202020204" pitchFamily="34" charset="0"/>
+              <a:buChar char="•"/>
+            </a:pPr>
+            <a:r>
+              <a:rPr lang="en-GB" sz="1100" dirty="0">
+                <a:effectLst/>
+                <a:latin typeface="Calibri" panose="020F0502020204030204" pitchFamily="34" charset="0"/>
+              </a:rPr>
+              <a:t>Controlling population size (tbc when more parameter sets fitted)</a:t>
+            </a:r>
+          </a:p>
+          <a:p>
+            <a:pPr marL="1143000" lvl="2" indent="-228600" rtl="0" fontAlgn="ctr">
+              <a:spcBef>
+                <a:spcPts val="0"/>
+              </a:spcBef>
+              <a:spcAft>
+                <a:spcPts val="0"/>
+              </a:spcAft>
+              <a:buFont typeface="Arial" panose="020B0604020202020204" pitchFamily="34" charset="0"/>
+              <a:buChar char="§"/>
+            </a:pPr>
+            <a:r>
+              <a:rPr lang="en-GB" sz="1100" dirty="0">
+                <a:solidFill>
+                  <a:srgbClr val="7F7F7F"/>
+                </a:solidFill>
+                <a:effectLst/>
+                <a:latin typeface="Calibri" panose="020F0502020204030204" pitchFamily="34" charset="0"/>
+              </a:rPr>
+              <a:t>GF: Need to think about end population - stable / exponential / avoid collapse</a:t>
+            </a:r>
+          </a:p>
+          <a:p>
+            <a:pPr marL="742950" lvl="1" indent="-285750" rtl="0" fontAlgn="ctr">
+              <a:spcBef>
+                <a:spcPts val="0"/>
+              </a:spcBef>
+              <a:spcAft>
+                <a:spcPts val="0"/>
+              </a:spcAft>
+              <a:buFont typeface="Arial" panose="020B0604020202020204" pitchFamily="34" charset="0"/>
+              <a:buChar char="•"/>
+            </a:pPr>
+            <a:r>
+              <a:rPr lang="en-GB" sz="1100" dirty="0">
+                <a:effectLst/>
+                <a:latin typeface="Calibri" panose="020F0502020204030204" pitchFamily="34" charset="0"/>
+              </a:rPr>
+              <a:t>Add in transmission</a:t>
+            </a:r>
+          </a:p>
+          <a:p>
+            <a:pPr marL="742950" lvl="1" indent="-285750" rtl="0" fontAlgn="ctr">
+              <a:spcBef>
+                <a:spcPts val="0"/>
+              </a:spcBef>
+              <a:spcAft>
+                <a:spcPts val="0"/>
+              </a:spcAft>
+              <a:buFont typeface="Arial" panose="020B0604020202020204" pitchFamily="34" charset="0"/>
+              <a:buChar char="•"/>
+            </a:pPr>
+            <a:r>
+              <a:rPr lang="en-GB" sz="1100" dirty="0">
+                <a:effectLst/>
+                <a:latin typeface="Calibri" panose="020F0502020204030204" pitchFamily="34" charset="0"/>
+              </a:rPr>
+              <a:t>Seasonality of demographic rates (how?) - thinking just 2 seasons, 1 "peak", remainder "normal"</a:t>
+            </a:r>
+          </a:p>
+          <a:p>
+            <a:pPr rtl="0" fontAlgn="ctr">
+              <a:spcBef>
+                <a:spcPts val="0"/>
+              </a:spcBef>
+              <a:spcAft>
+                <a:spcPts val="0"/>
+              </a:spcAft>
+              <a:buFont typeface="Courier New" panose="02070309020205020404" pitchFamily="49" charset="0"/>
+              <a:buChar char="o"/>
+            </a:pPr>
+            <a:r>
+              <a:rPr lang="en-GB" sz="1100" dirty="0">
+                <a:effectLst/>
+                <a:latin typeface="Calibri" panose="020F0502020204030204" pitchFamily="34" charset="0"/>
+              </a:rPr>
+              <a:t>Timestep of model</a:t>
+            </a:r>
+          </a:p>
+          <a:p>
+            <a:pPr marL="742950" lvl="1" indent="-285750" rtl="0" fontAlgn="ctr">
+              <a:spcBef>
+                <a:spcPts val="0"/>
+              </a:spcBef>
+              <a:spcAft>
+                <a:spcPts val="0"/>
+              </a:spcAft>
+              <a:buFont typeface="Arial" panose="020B0604020202020204" pitchFamily="34" charset="0"/>
+              <a:buChar char="•"/>
+            </a:pPr>
+            <a:r>
+              <a:rPr lang="en-GB" sz="1100" dirty="0">
+                <a:effectLst/>
+                <a:latin typeface="Calibri" panose="020F0502020204030204" pitchFamily="34" charset="0"/>
+              </a:rPr>
+              <a:t>Weekly demographic rates are hard to come by…</a:t>
+            </a:r>
+          </a:p>
+        </p:txBody>
+      </p:sp>
+    </p:spTree>
+    <p:extLst>
+      <p:ext uri="{BB962C8B-B14F-4D97-AF65-F5344CB8AC3E}">
+        <p14:creationId xmlns:p14="http://schemas.microsoft.com/office/powerpoint/2010/main" val="2166822845"/>
       </p:ext>
     </p:extLst>
   </p:cSld>

</xml_diff>

<commit_message>
updating parameters for model
</commit_message>
<xml_diff>
--- a/results-presentations/model-test-BAOBAB.pptx
+++ b/results-presentations/model-test-BAOBAB.pptx
@@ -124,7 +124,7 @@
 <file path=ppt/revisionInfo.xml><?xml version="1.0" encoding="utf-8"?>
 <p1510:revInfo xmlns:a="http://schemas.openxmlformats.org/drawingml/2006/main" xmlns:r="http://schemas.openxmlformats.org/officeDocument/2006/relationships" xmlns:p1510="http://schemas.microsoft.com/office/powerpoint/2015/10/main">
   <p1510:revLst>
-    <p1510:client id="{A1FE3073-CEB4-3140-B0CA-5FEA12E5C3D9}" v="12" dt="2023-02-28T12:33:09.803"/>
+    <p1510:client id="{3A5BAB18-A7D2-1646-8C2B-E00ADF9A013D}" v="2" dt="2023-03-01T14:32:07.601"/>
   </p1510:revLst>
 </p1510:revInfo>
 </file>
@@ -445,6 +445,91 @@
       </pc:sldChg>
     </pc:docChg>
   </pc:docChgLst>
+  <pc:docChgLst>
+    <pc:chgData name="Savagar, Bethan Alice" userId="dc0b6509-dca5-46f6-b355-e03f7348faa9" providerId="ADAL" clId="{3A5BAB18-A7D2-1646-8C2B-E00ADF9A013D}"/>
+    <pc:docChg chg="custSel modSld">
+      <pc:chgData name="Savagar, Bethan Alice" userId="dc0b6509-dca5-46f6-b355-e03f7348faa9" providerId="ADAL" clId="{3A5BAB18-A7D2-1646-8C2B-E00ADF9A013D}" dt="2023-03-01T14:34:20.658" v="221" actId="20577"/>
+      <pc:docMkLst>
+        <pc:docMk/>
+      </pc:docMkLst>
+      <pc:sldChg chg="modSp mod">
+        <pc:chgData name="Savagar, Bethan Alice" userId="dc0b6509-dca5-46f6-b355-e03f7348faa9" providerId="ADAL" clId="{3A5BAB18-A7D2-1646-8C2B-E00ADF9A013D}" dt="2023-03-01T14:31:38.321" v="9" actId="20577"/>
+        <pc:sldMkLst>
+          <pc:docMk/>
+          <pc:sldMk cId="73896297" sldId="256"/>
+        </pc:sldMkLst>
+        <pc:spChg chg="mod">
+          <ac:chgData name="Savagar, Bethan Alice" userId="dc0b6509-dca5-46f6-b355-e03f7348faa9" providerId="ADAL" clId="{3A5BAB18-A7D2-1646-8C2B-E00ADF9A013D}" dt="2023-03-01T14:31:38.321" v="9" actId="20577"/>
+          <ac:spMkLst>
+            <pc:docMk/>
+            <pc:sldMk cId="73896297" sldId="256"/>
+            <ac:spMk id="3" creationId="{3DFD11F4-0EB5-3BAD-96DF-D1CBD44D20FC}"/>
+          </ac:spMkLst>
+        </pc:spChg>
+      </pc:sldChg>
+      <pc:sldChg chg="modSp mod">
+        <pc:chgData name="Savagar, Bethan Alice" userId="dc0b6509-dca5-46f6-b355-e03f7348faa9" providerId="ADAL" clId="{3A5BAB18-A7D2-1646-8C2B-E00ADF9A013D}" dt="2023-03-01T14:34:20.658" v="221" actId="20577"/>
+        <pc:sldMkLst>
+          <pc:docMk/>
+          <pc:sldMk cId="2073572194" sldId="260"/>
+        </pc:sldMkLst>
+        <pc:spChg chg="mod">
+          <ac:chgData name="Savagar, Bethan Alice" userId="dc0b6509-dca5-46f6-b355-e03f7348faa9" providerId="ADAL" clId="{3A5BAB18-A7D2-1646-8C2B-E00ADF9A013D}" dt="2023-03-01T14:34:20.658" v="221" actId="20577"/>
+          <ac:spMkLst>
+            <pc:docMk/>
+            <pc:sldMk cId="2073572194" sldId="260"/>
+            <ac:spMk id="8" creationId="{1FFCA54F-F596-9ACA-B8C7-D844C41C9AC4}"/>
+          </ac:spMkLst>
+        </pc:spChg>
+      </pc:sldChg>
+      <pc:sldChg chg="addSp modSp mod">
+        <pc:chgData name="Savagar, Bethan Alice" userId="dc0b6509-dca5-46f6-b355-e03f7348faa9" providerId="ADAL" clId="{3A5BAB18-A7D2-1646-8C2B-E00ADF9A013D}" dt="2023-03-01T14:32:26.196" v="84" actId="20577"/>
+        <pc:sldMkLst>
+          <pc:docMk/>
+          <pc:sldMk cId="1361513349" sldId="262"/>
+        </pc:sldMkLst>
+        <pc:spChg chg="add mod">
+          <ac:chgData name="Savagar, Bethan Alice" userId="dc0b6509-dca5-46f6-b355-e03f7348faa9" providerId="ADAL" clId="{3A5BAB18-A7D2-1646-8C2B-E00ADF9A013D}" dt="2023-03-01T14:32:05.299" v="32" actId="1076"/>
+          <ac:spMkLst>
+            <pc:docMk/>
+            <pc:sldMk cId="1361513349" sldId="262"/>
+            <ac:spMk id="3" creationId="{619F8B46-E62F-BBE2-8B4D-FB3A6646BF82}"/>
+          </ac:spMkLst>
+        </pc:spChg>
+        <pc:spChg chg="add mod">
+          <ac:chgData name="Savagar, Bethan Alice" userId="dc0b6509-dca5-46f6-b355-e03f7348faa9" providerId="ADAL" clId="{3A5BAB18-A7D2-1646-8C2B-E00ADF9A013D}" dt="2023-03-01T14:32:26.196" v="84" actId="20577"/>
+          <ac:spMkLst>
+            <pc:docMk/>
+            <pc:sldMk cId="1361513349" sldId="262"/>
+            <ac:spMk id="6" creationId="{D1F50478-D622-ACBF-1EAA-D97DB0B1ED7E}"/>
+          </ac:spMkLst>
+        </pc:spChg>
+      </pc:sldChg>
+      <pc:sldChg chg="modSp mod">
+        <pc:chgData name="Savagar, Bethan Alice" userId="dc0b6509-dca5-46f6-b355-e03f7348faa9" providerId="ADAL" clId="{3A5BAB18-A7D2-1646-8C2B-E00ADF9A013D}" dt="2023-03-01T14:33:14.825" v="147" actId="20577"/>
+        <pc:sldMkLst>
+          <pc:docMk/>
+          <pc:sldMk cId="3929642493" sldId="263"/>
+        </pc:sldMkLst>
+        <pc:spChg chg="mod">
+          <ac:chgData name="Savagar, Bethan Alice" userId="dc0b6509-dca5-46f6-b355-e03f7348faa9" providerId="ADAL" clId="{3A5BAB18-A7D2-1646-8C2B-E00ADF9A013D}" dt="2023-03-01T14:32:43.649" v="89" actId="20577"/>
+          <ac:spMkLst>
+            <pc:docMk/>
+            <pc:sldMk cId="3929642493" sldId="263"/>
+            <ac:spMk id="2" creationId="{886AA6A4-35E3-0AA1-51AC-149697AD0686}"/>
+          </ac:spMkLst>
+        </pc:spChg>
+        <pc:spChg chg="mod">
+          <ac:chgData name="Savagar, Bethan Alice" userId="dc0b6509-dca5-46f6-b355-e03f7348faa9" providerId="ADAL" clId="{3A5BAB18-A7D2-1646-8C2B-E00ADF9A013D}" dt="2023-03-01T14:33:14.825" v="147" actId="20577"/>
+          <ac:spMkLst>
+            <pc:docMk/>
+            <pc:sldMk cId="3929642493" sldId="263"/>
+            <ac:spMk id="13" creationId="{951DF4FF-9FD7-7618-5391-A4CB6A93BFAA}"/>
+          </ac:spMkLst>
+        </pc:spChg>
+      </pc:sldChg>
+    </pc:docChg>
+  </pc:docChgLst>
 </pc:chgInfo>
 </file>
 
@@ -586,7 +671,7 @@
           <a:p>
             <a:fld id="{12BFABB2-EEA0-864E-BF55-7EF7D8AD924B}" type="datetimeFigureOut">
               <a:rPr lang="en-US" smtClean="0"/>
-              <a:t>2/27/23</a:t>
+              <a:t>3/1/23</a:t>
             </a:fld>
             <a:endParaRPr lang="en-US"/>
           </a:p>
@@ -1582,7 +1667,7 @@
           <a:p>
             <a:fld id="{17EE346A-1225-314F-8E90-18293479AF17}" type="datetimeFigureOut">
               <a:rPr lang="en-US" smtClean="0"/>
-              <a:t>2/27/23</a:t>
+              <a:t>3/1/23</a:t>
             </a:fld>
             <a:endParaRPr lang="en-US"/>
           </a:p>
@@ -1782,7 +1867,7 @@
           <a:p>
             <a:fld id="{17EE346A-1225-314F-8E90-18293479AF17}" type="datetimeFigureOut">
               <a:rPr lang="en-US" smtClean="0"/>
-              <a:t>2/27/23</a:t>
+              <a:t>3/1/23</a:t>
             </a:fld>
             <a:endParaRPr lang="en-US"/>
           </a:p>
@@ -1992,7 +2077,7 @@
           <a:p>
             <a:fld id="{17EE346A-1225-314F-8E90-18293479AF17}" type="datetimeFigureOut">
               <a:rPr lang="en-US" smtClean="0"/>
-              <a:t>2/27/23</a:t>
+              <a:t>3/1/23</a:t>
             </a:fld>
             <a:endParaRPr lang="en-US"/>
           </a:p>
@@ -2192,7 +2277,7 @@
           <a:p>
             <a:fld id="{17EE346A-1225-314F-8E90-18293479AF17}" type="datetimeFigureOut">
               <a:rPr lang="en-US" smtClean="0"/>
-              <a:t>2/27/23</a:t>
+              <a:t>3/1/23</a:t>
             </a:fld>
             <a:endParaRPr lang="en-US"/>
           </a:p>
@@ -2468,7 +2553,7 @@
           <a:p>
             <a:fld id="{17EE346A-1225-314F-8E90-18293479AF17}" type="datetimeFigureOut">
               <a:rPr lang="en-US" smtClean="0"/>
-              <a:t>2/27/23</a:t>
+              <a:t>3/1/23</a:t>
             </a:fld>
             <a:endParaRPr lang="en-US"/>
           </a:p>
@@ -2736,7 +2821,7 @@
           <a:p>
             <a:fld id="{17EE346A-1225-314F-8E90-18293479AF17}" type="datetimeFigureOut">
               <a:rPr lang="en-US" smtClean="0"/>
-              <a:t>2/27/23</a:t>
+              <a:t>3/1/23</a:t>
             </a:fld>
             <a:endParaRPr lang="en-US"/>
           </a:p>
@@ -3151,7 +3236,7 @@
           <a:p>
             <a:fld id="{17EE346A-1225-314F-8E90-18293479AF17}" type="datetimeFigureOut">
               <a:rPr lang="en-US" smtClean="0"/>
-              <a:t>2/27/23</a:t>
+              <a:t>3/1/23</a:t>
             </a:fld>
             <a:endParaRPr lang="en-US"/>
           </a:p>
@@ -3293,7 +3378,7 @@
           <a:p>
             <a:fld id="{17EE346A-1225-314F-8E90-18293479AF17}" type="datetimeFigureOut">
               <a:rPr lang="en-US" smtClean="0"/>
-              <a:t>2/27/23</a:t>
+              <a:t>3/1/23</a:t>
             </a:fld>
             <a:endParaRPr lang="en-US"/>
           </a:p>
@@ -3406,7 +3491,7 @@
           <a:p>
             <a:fld id="{17EE346A-1225-314F-8E90-18293479AF17}" type="datetimeFigureOut">
               <a:rPr lang="en-US" smtClean="0"/>
-              <a:t>2/27/23</a:t>
+              <a:t>3/1/23</a:t>
             </a:fld>
             <a:endParaRPr lang="en-US"/>
           </a:p>
@@ -3719,7 +3804,7 @@
           <a:p>
             <a:fld id="{17EE346A-1225-314F-8E90-18293479AF17}" type="datetimeFigureOut">
               <a:rPr lang="en-US" smtClean="0"/>
-              <a:t>2/27/23</a:t>
+              <a:t>3/1/23</a:t>
             </a:fld>
             <a:endParaRPr lang="en-US"/>
           </a:p>
@@ -4008,7 +4093,7 @@
           <a:p>
             <a:fld id="{17EE346A-1225-314F-8E90-18293479AF17}" type="datetimeFigureOut">
               <a:rPr lang="en-US" smtClean="0"/>
-              <a:t>2/27/23</a:t>
+              <a:t>3/1/23</a:t>
             </a:fld>
             <a:endParaRPr lang="en-US"/>
           </a:p>
@@ -4251,7 +4336,7 @@
           <a:p>
             <a:fld id="{17EE346A-1225-314F-8E90-18293479AF17}" type="datetimeFigureOut">
               <a:rPr lang="en-US" smtClean="0"/>
-              <a:t>2/27/23</a:t>
+              <a:t>3/1/23</a:t>
             </a:fld>
             <a:endParaRPr lang="en-US"/>
           </a:p>
@@ -4717,7 +4802,10 @@
           <a:bodyPr/>
           <a:lstStyle/>
           <a:p>
-            <a:endParaRPr lang="en-US"/>
+            <a:r>
+              <a:rPr lang="en-US" dirty="0"/>
+              <a:t>02/03/2023</a:t>
+            </a:r>
           </a:p>
         </p:txBody>
       </p:sp>
@@ -5037,6 +5125,80 @@
           </a:p>
         </p:txBody>
       </p:sp>
+      <p:sp>
+        <p:nvSpPr>
+          <p:cNvPr id="3" name="TextBox 2">
+            <a:extLst>
+              <a:ext uri="{FF2B5EF4-FFF2-40B4-BE49-F238E27FC236}">
+                <a16:creationId xmlns:a16="http://schemas.microsoft.com/office/drawing/2014/main" id="{619F8B46-E62F-BBE2-8B4D-FB3A6646BF82}"/>
+              </a:ext>
+            </a:extLst>
+          </p:cNvPr>
+          <p:cNvSpPr txBox="1"/>
+          <p:nvPr/>
+        </p:nvSpPr>
+        <p:spPr>
+          <a:xfrm>
+            <a:off x="407963" y="1252577"/>
+            <a:ext cx="2715186" cy="369332"/>
+          </a:xfrm>
+          <a:prstGeom prst="rect">
+            <a:avLst/>
+          </a:prstGeom>
+          <a:noFill/>
+        </p:spPr>
+        <p:txBody>
+          <a:bodyPr wrap="square" rtlCol="0">
+            <a:spAutoFit/>
+          </a:bodyPr>
+          <a:lstStyle/>
+          <a:p>
+            <a:r>
+              <a:rPr lang="en-US" dirty="0"/>
+              <a:t>Data from papers:</a:t>
+            </a:r>
+          </a:p>
+        </p:txBody>
+      </p:sp>
+      <p:sp>
+        <p:nvSpPr>
+          <p:cNvPr id="6" name="TextBox 5">
+            <a:extLst>
+              <a:ext uri="{FF2B5EF4-FFF2-40B4-BE49-F238E27FC236}">
+                <a16:creationId xmlns:a16="http://schemas.microsoft.com/office/drawing/2014/main" id="{D1F50478-D622-ACBF-1EAA-D97DB0B1ED7E}"/>
+              </a:ext>
+            </a:extLst>
+          </p:cNvPr>
+          <p:cNvSpPr txBox="1"/>
+          <p:nvPr/>
+        </p:nvSpPr>
+        <p:spPr>
+          <a:xfrm>
+            <a:off x="6095998" y="1353514"/>
+            <a:ext cx="3131005" cy="369332"/>
+          </a:xfrm>
+          <a:prstGeom prst="rect">
+            <a:avLst/>
+          </a:prstGeom>
+          <a:noFill/>
+        </p:spPr>
+        <p:txBody>
+          <a:bodyPr wrap="square" rtlCol="0">
+            <a:spAutoFit/>
+          </a:bodyPr>
+          <a:lstStyle/>
+          <a:p>
+            <a:r>
+              <a:rPr lang="en-US" dirty="0" err="1"/>
+              <a:t>Bodjo</a:t>
+            </a:r>
+            <a:r>
+              <a:rPr lang="en-US" dirty="0"/>
+              <a:t> data + modelled decay</a:t>
+            </a:r>
+          </a:p>
+        </p:txBody>
+      </p:sp>
     </p:spTree>
     <p:extLst>
       <p:ext uri="{BB962C8B-B14F-4D97-AF65-F5344CB8AC3E}">
@@ -5090,7 +5252,7 @@
           <a:p>
             <a:r>
               <a:rPr lang="en-US" dirty="0"/>
-              <a:t>BAOBAB Test</a:t>
+              <a:t>BAOBAB Test Data</a:t>
             </a:r>
           </a:p>
         </p:txBody>
@@ -5323,8 +5485,8 @@
           </a:fontRef>
         </p:style>
       </p:cxnSp>
-      <mc:AlternateContent xmlns:mc="http://schemas.openxmlformats.org/markup-compatibility/2006">
-        <mc:Choice xmlns:p14="http://schemas.microsoft.com/office/powerpoint/2010/main" Requires="p14">
+      <mc:AlternateContent xmlns:mc="http://schemas.openxmlformats.org/markup-compatibility/2006" xmlns:p14="http://schemas.microsoft.com/office/powerpoint/2010/main">
+        <mc:Choice Requires="p14">
           <p:contentPart p14:bwMode="auto" r:id="rId3">
             <p14:nvContentPartPr>
               <p14:cNvPr id="10" name="Ink 9">
@@ -5343,7 +5505,7 @@
             </p14:xfrm>
           </p:contentPart>
         </mc:Choice>
-        <mc:Fallback>
+        <mc:Fallback xmlns="">
           <p:pic>
             <p:nvPicPr>
               <p:cNvPr id="10" name="Ink 9">
@@ -5374,8 +5536,8 @@
           </p:pic>
         </mc:Fallback>
       </mc:AlternateContent>
-      <mc:AlternateContent xmlns:mc="http://schemas.openxmlformats.org/markup-compatibility/2006">
-        <mc:Choice xmlns:p14="http://schemas.microsoft.com/office/powerpoint/2010/main" Requires="p14">
+      <mc:AlternateContent xmlns:mc="http://schemas.openxmlformats.org/markup-compatibility/2006" xmlns:p14="http://schemas.microsoft.com/office/powerpoint/2010/main">
+        <mc:Choice Requires="p14">
           <p:contentPart p14:bwMode="auto" r:id="rId5">
             <p14:nvContentPartPr>
               <p14:cNvPr id="11" name="Ink 10">
@@ -5394,7 +5556,7 @@
             </p14:xfrm>
           </p:contentPart>
         </mc:Choice>
-        <mc:Fallback>
+        <mc:Fallback xmlns="">
           <p:pic>
             <p:nvPicPr>
               <p:cNvPr id="11" name="Ink 10">
@@ -5487,7 +5649,7 @@
         <p:spPr>
           <a:xfrm>
             <a:off x="639526" y="4738549"/>
-            <a:ext cx="3257225" cy="1754326"/>
+            <a:ext cx="4354505" cy="1754326"/>
           </a:xfrm>
           <a:prstGeom prst="rect">
             <a:avLst/>
@@ -5502,7 +5664,7 @@
           <a:p>
             <a:r>
               <a:rPr lang="en-US" dirty="0"/>
-              <a:t>Starting population: 1700</a:t>
+              <a:t>Starting population: 1700 (arbitrary)</a:t>
             </a:r>
           </a:p>
           <a:p>
@@ -5542,7 +5704,10 @@
             </a:r>
           </a:p>
           <a:p>
-            <a:endParaRPr lang="en-US" dirty="0"/>
+            <a:r>
+              <a:rPr lang="en-US" dirty="0"/>
+              <a:t>- Similar to reported proportions in field</a:t>
+            </a:r>
           </a:p>
         </p:txBody>
       </p:sp>
@@ -5730,7 +5895,7 @@
         <p:spPr>
           <a:xfrm>
             <a:off x="379828" y="3727938"/>
-            <a:ext cx="7554350" cy="923330"/>
+            <a:ext cx="7554350" cy="1477328"/>
           </a:xfrm>
           <a:prstGeom prst="rect">
             <a:avLst/>
@@ -5761,6 +5926,27 @@
               <a:rPr lang="en-US" dirty="0"/>
               <a:t>Age-sex structure of population not maintained (no age-sex differences for trade, deaths)</a:t>
             </a:r>
+          </a:p>
+          <a:p>
+            <a:pPr marL="742950" lvl="1" indent="-285750">
+              <a:buFont typeface="Arial" panose="020B0604020202020204" pitchFamily="34" charset="0"/>
+              <a:buChar char="•"/>
+            </a:pPr>
+            <a:r>
+              <a:rPr lang="en-US" dirty="0"/>
+              <a:t>i.e. expect higher male offtake (should help </a:t>
+            </a:r>
+            <a:r>
+              <a:rPr lang="en-US"/>
+              <a:t>maintain proportion F)</a:t>
+            </a:r>
+          </a:p>
+          <a:p>
+            <a:pPr marL="742950" lvl="1" indent="-285750">
+              <a:buFont typeface="Arial" panose="020B0604020202020204" pitchFamily="34" charset="0"/>
+              <a:buChar char="•"/>
+            </a:pPr>
+            <a:endParaRPr lang="en-US" dirty="0"/>
           </a:p>
         </p:txBody>
       </p:sp>

</xml_diff>

<commit_message>
correct immune decay and run test of immune decay
</commit_message>
<xml_diff>
--- a/results-presentations/model-test-BAOBAB.pptx
+++ b/results-presentations/model-test-BAOBAB.pptx
@@ -5,7 +5,7 @@
     <p:sldMasterId id="2147483648" r:id="rId1"/>
   </p:sldMasterIdLst>
   <p:notesMasterIdLst>
-    <p:notesMasterId r:id="rId9"/>
+    <p:notesMasterId r:id="rId11"/>
   </p:notesMasterIdLst>
   <p:sldIdLst>
     <p:sldId id="256" r:id="rId2"/>
@@ -14,7 +14,9 @@
     <p:sldId id="260" r:id="rId5"/>
     <p:sldId id="264" r:id="rId6"/>
     <p:sldId id="265" r:id="rId7"/>
-    <p:sldId id="266" r:id="rId8"/>
+    <p:sldId id="267" r:id="rId8"/>
+    <p:sldId id="268" r:id="rId9"/>
+    <p:sldId id="269" r:id="rId10"/>
   </p:sldIdLst>
   <p:sldSz cx="12192000" cy="6858000"/>
   <p:notesSz cx="6858000" cy="9144000"/>
@@ -124,7 +126,7 @@
 <file path=ppt/revisionInfo.xml><?xml version="1.0" encoding="utf-8"?>
 <p1510:revInfo xmlns:a="http://schemas.openxmlformats.org/drawingml/2006/main" xmlns:r="http://schemas.openxmlformats.org/officeDocument/2006/relationships" xmlns:p1510="http://schemas.microsoft.com/office/powerpoint/2015/10/main">
   <p1510:revLst>
-    <p1510:client id="{3A5BAB18-A7D2-1646-8C2B-E00ADF9A013D}" v="2" dt="2023-03-01T14:32:07.601"/>
+    <p1510:client id="{3A5BAB18-A7D2-1646-8C2B-E00ADF9A013D}" v="4" dt="2023-03-09T12:36:02.631"/>
   </p1510:revLst>
 </p1510:revInfo>
 </file>
@@ -447,8 +449,8 @@
   </pc:docChgLst>
   <pc:docChgLst>
     <pc:chgData name="Savagar, Bethan Alice" userId="dc0b6509-dca5-46f6-b355-e03f7348faa9" providerId="ADAL" clId="{3A5BAB18-A7D2-1646-8C2B-E00ADF9A013D}"/>
-    <pc:docChg chg="custSel modSld">
-      <pc:chgData name="Savagar, Bethan Alice" userId="dc0b6509-dca5-46f6-b355-e03f7348faa9" providerId="ADAL" clId="{3A5BAB18-A7D2-1646-8C2B-E00ADF9A013D}" dt="2023-03-01T14:34:20.658" v="221" actId="20577"/>
+    <pc:docChg chg="custSel addSld delSld modSld">
+      <pc:chgData name="Savagar, Bethan Alice" userId="dc0b6509-dca5-46f6-b355-e03f7348faa9" providerId="ADAL" clId="{3A5BAB18-A7D2-1646-8C2B-E00ADF9A013D}" dt="2023-03-09T12:36:09.568" v="819" actId="20577"/>
       <pc:docMkLst>
         <pc:docMk/>
       </pc:docMkLst>
@@ -482,8 +484,8 @@
           </ac:spMkLst>
         </pc:spChg>
       </pc:sldChg>
-      <pc:sldChg chg="addSp modSp mod">
-        <pc:chgData name="Savagar, Bethan Alice" userId="dc0b6509-dca5-46f6-b355-e03f7348faa9" providerId="ADAL" clId="{3A5BAB18-A7D2-1646-8C2B-E00ADF9A013D}" dt="2023-03-01T14:32:26.196" v="84" actId="20577"/>
+      <pc:sldChg chg="addSp modSp mod modNotesTx">
+        <pc:chgData name="Savagar, Bethan Alice" userId="dc0b6509-dca5-46f6-b355-e03f7348faa9" providerId="ADAL" clId="{3A5BAB18-A7D2-1646-8C2B-E00ADF9A013D}" dt="2023-03-09T10:03:22.320" v="538" actId="20577"/>
         <pc:sldMkLst>
           <pc:docMk/>
           <pc:sldMk cId="1361513349" sldId="262"/>
@@ -527,6 +529,90 @@
             <ac:spMk id="13" creationId="{951DF4FF-9FD7-7618-5391-A4CB6A93BFAA}"/>
           </ac:spMkLst>
         </pc:spChg>
+      </pc:sldChg>
+      <pc:sldChg chg="del">
+        <pc:chgData name="Savagar, Bethan Alice" userId="dc0b6509-dca5-46f6-b355-e03f7348faa9" providerId="ADAL" clId="{3A5BAB18-A7D2-1646-8C2B-E00ADF9A013D}" dt="2023-03-09T10:01:41.653" v="223" actId="2696"/>
+        <pc:sldMkLst>
+          <pc:docMk/>
+          <pc:sldMk cId="1859828439" sldId="266"/>
+        </pc:sldMkLst>
+      </pc:sldChg>
+      <pc:sldChg chg="modSp new mod">
+        <pc:chgData name="Savagar, Bethan Alice" userId="dc0b6509-dca5-46f6-b355-e03f7348faa9" providerId="ADAL" clId="{3A5BAB18-A7D2-1646-8C2B-E00ADF9A013D}" dt="2023-03-09T10:01:49.113" v="260" actId="20577"/>
+        <pc:sldMkLst>
+          <pc:docMk/>
+          <pc:sldMk cId="1549157115" sldId="267"/>
+        </pc:sldMkLst>
+        <pc:spChg chg="mod">
+          <ac:chgData name="Savagar, Bethan Alice" userId="dc0b6509-dca5-46f6-b355-e03f7348faa9" providerId="ADAL" clId="{3A5BAB18-A7D2-1646-8C2B-E00ADF9A013D}" dt="2023-03-09T10:01:49.113" v="260" actId="20577"/>
+          <ac:spMkLst>
+            <pc:docMk/>
+            <pc:sldMk cId="1549157115" sldId="267"/>
+            <ac:spMk id="2" creationId="{9D5C6CC1-7331-744B-00F7-C9838CDDEB66}"/>
+          </ac:spMkLst>
+        </pc:spChg>
+      </pc:sldChg>
+      <pc:sldChg chg="addSp modSp new mod">
+        <pc:chgData name="Savagar, Bethan Alice" userId="dc0b6509-dca5-46f6-b355-e03f7348faa9" providerId="ADAL" clId="{3A5BAB18-A7D2-1646-8C2B-E00ADF9A013D}" dt="2023-03-09T10:05:55.540" v="802" actId="27636"/>
+        <pc:sldMkLst>
+          <pc:docMk/>
+          <pc:sldMk cId="955302800" sldId="268"/>
+        </pc:sldMkLst>
+        <pc:spChg chg="mod">
+          <ac:chgData name="Savagar, Bethan Alice" userId="dc0b6509-dca5-46f6-b355-e03f7348faa9" providerId="ADAL" clId="{3A5BAB18-A7D2-1646-8C2B-E00ADF9A013D}" dt="2023-03-09T10:05:38.807" v="762" actId="20577"/>
+          <ac:spMkLst>
+            <pc:docMk/>
+            <pc:sldMk cId="955302800" sldId="268"/>
+            <ac:spMk id="2" creationId="{8C7025F6-38A4-71F1-C210-81672BD3EB6D}"/>
+          </ac:spMkLst>
+        </pc:spChg>
+        <pc:spChg chg="mod">
+          <ac:chgData name="Savagar, Bethan Alice" userId="dc0b6509-dca5-46f6-b355-e03f7348faa9" providerId="ADAL" clId="{3A5BAB18-A7D2-1646-8C2B-E00ADF9A013D}" dt="2023-03-09T10:05:55.540" v="802" actId="27636"/>
+          <ac:spMkLst>
+            <pc:docMk/>
+            <pc:sldMk cId="955302800" sldId="268"/>
+            <ac:spMk id="3" creationId="{6CD2E1C0-CEC2-1E06-3848-7EE195EB6372}"/>
+          </ac:spMkLst>
+        </pc:spChg>
+        <pc:picChg chg="add mod">
+          <ac:chgData name="Savagar, Bethan Alice" userId="dc0b6509-dca5-46f6-b355-e03f7348faa9" providerId="ADAL" clId="{3A5BAB18-A7D2-1646-8C2B-E00ADF9A013D}" dt="2023-03-09T10:05:13.251" v="745" actId="1076"/>
+          <ac:picMkLst>
+            <pc:docMk/>
+            <pc:sldMk cId="955302800" sldId="268"/>
+            <ac:picMk id="4" creationId="{DB16E72D-EE15-CD23-E03C-BC00A171E81E}"/>
+          </ac:picMkLst>
+        </pc:picChg>
+      </pc:sldChg>
+      <pc:sldChg chg="addSp delSp modSp new mod">
+        <pc:chgData name="Savagar, Bethan Alice" userId="dc0b6509-dca5-46f6-b355-e03f7348faa9" providerId="ADAL" clId="{3A5BAB18-A7D2-1646-8C2B-E00ADF9A013D}" dt="2023-03-09T12:36:09.568" v="819" actId="20577"/>
+        <pc:sldMkLst>
+          <pc:docMk/>
+          <pc:sldMk cId="3349671045" sldId="269"/>
+        </pc:sldMkLst>
+        <pc:spChg chg="mod">
+          <ac:chgData name="Savagar, Bethan Alice" userId="dc0b6509-dca5-46f6-b355-e03f7348faa9" providerId="ADAL" clId="{3A5BAB18-A7D2-1646-8C2B-E00ADF9A013D}" dt="2023-03-09T12:36:09.568" v="819" actId="20577"/>
+          <ac:spMkLst>
+            <pc:docMk/>
+            <pc:sldMk cId="3349671045" sldId="269"/>
+            <ac:spMk id="2" creationId="{B69E2D86-3324-8802-4A9F-3F499F519DA0}"/>
+          </ac:spMkLst>
+        </pc:spChg>
+        <pc:spChg chg="del">
+          <ac:chgData name="Savagar, Bethan Alice" userId="dc0b6509-dca5-46f6-b355-e03f7348faa9" providerId="ADAL" clId="{3A5BAB18-A7D2-1646-8C2B-E00ADF9A013D}" dt="2023-03-09T12:36:02.629" v="804" actId="931"/>
+          <ac:spMkLst>
+            <pc:docMk/>
+            <pc:sldMk cId="3349671045" sldId="269"/>
+            <ac:spMk id="3" creationId="{7D82F283-BBD2-F025-7E60-F80834798208}"/>
+          </ac:spMkLst>
+        </pc:spChg>
+        <pc:picChg chg="add mod">
+          <ac:chgData name="Savagar, Bethan Alice" userId="dc0b6509-dca5-46f6-b355-e03f7348faa9" providerId="ADAL" clId="{3A5BAB18-A7D2-1646-8C2B-E00ADF9A013D}" dt="2023-03-09T12:36:04.990" v="805" actId="27614"/>
+          <ac:picMkLst>
+            <pc:docMk/>
+            <pc:sldMk cId="3349671045" sldId="269"/>
+            <ac:picMk id="5" creationId="{67879477-76D7-7E4E-9FCF-BD8C428F9321}"/>
+          </ac:picMkLst>
+        </pc:picChg>
       </pc:sldChg>
     </pc:docChg>
   </pc:docChgLst>
@@ -671,7 +757,7 @@
           <a:p>
             <a:fld id="{12BFABB2-EEA0-864E-BF55-7EF7D8AD924B}" type="datetimeFigureOut">
               <a:rPr lang="en-US" smtClean="0"/>
-              <a:t>3/1/23</a:t>
+              <a:t>3/9/23</a:t>
             </a:fld>
             <a:endParaRPr lang="en-US"/>
           </a:p>
@@ -1205,6 +1291,30 @@
             </a:r>
           </a:p>
           <a:p>
+            <a:pPr marL="285750" lvl="0" indent="-285750">
+              <a:buFont typeface="Courier New" panose="02070309020205020404" pitchFamily="49" charset="0"/>
+              <a:buChar char="o"/>
+            </a:pPr>
+            <a:r>
+              <a:rPr lang="en-GB" sz="1200" dirty="0" err="1">
+                <a:effectLst/>
+                <a:latin typeface="Calibri" panose="020F0502020204030204" pitchFamily="34" charset="0"/>
+                <a:ea typeface="Calibri" panose="020F0502020204030204" pitchFamily="34" charset="0"/>
+                <a:cs typeface="Times New Roman" panose="02020603050405020304" pitchFamily="18" charset="0"/>
+              </a:rPr>
+              <a:t>Bodjo</a:t>
+            </a:r>
+            <a:r>
+              <a:rPr lang="en-GB" sz="1200" dirty="0">
+                <a:effectLst/>
+                <a:latin typeface="Calibri" panose="020F0502020204030204" pitchFamily="34" charset="0"/>
+                <a:ea typeface="Calibri" panose="020F0502020204030204" pitchFamily="34" charset="0"/>
+                <a:cs typeface="Times New Roman" panose="02020603050405020304" pitchFamily="18" charset="0"/>
+              </a:rPr>
+              <a:t> data provides proportion of all lambs that are immune at each timepoint, we need the decay rate (or proportion of lambs at previous timestep)</a:t>
+            </a:r>
+          </a:p>
+          <a:p>
             <a:endParaRPr lang="en-US" dirty="0"/>
           </a:p>
         </p:txBody>
@@ -1667,7 +1777,7 @@
           <a:p>
             <a:fld id="{17EE346A-1225-314F-8E90-18293479AF17}" type="datetimeFigureOut">
               <a:rPr lang="en-US" smtClean="0"/>
-              <a:t>3/1/23</a:t>
+              <a:t>3/9/23</a:t>
             </a:fld>
             <a:endParaRPr lang="en-US"/>
           </a:p>
@@ -1867,7 +1977,7 @@
           <a:p>
             <a:fld id="{17EE346A-1225-314F-8E90-18293479AF17}" type="datetimeFigureOut">
               <a:rPr lang="en-US" smtClean="0"/>
-              <a:t>3/1/23</a:t>
+              <a:t>3/9/23</a:t>
             </a:fld>
             <a:endParaRPr lang="en-US"/>
           </a:p>
@@ -2077,7 +2187,7 @@
           <a:p>
             <a:fld id="{17EE346A-1225-314F-8E90-18293479AF17}" type="datetimeFigureOut">
               <a:rPr lang="en-US" smtClean="0"/>
-              <a:t>3/1/23</a:t>
+              <a:t>3/9/23</a:t>
             </a:fld>
             <a:endParaRPr lang="en-US"/>
           </a:p>
@@ -2277,7 +2387,7 @@
           <a:p>
             <a:fld id="{17EE346A-1225-314F-8E90-18293479AF17}" type="datetimeFigureOut">
               <a:rPr lang="en-US" smtClean="0"/>
-              <a:t>3/1/23</a:t>
+              <a:t>3/9/23</a:t>
             </a:fld>
             <a:endParaRPr lang="en-US"/>
           </a:p>
@@ -2553,7 +2663,7 @@
           <a:p>
             <a:fld id="{17EE346A-1225-314F-8E90-18293479AF17}" type="datetimeFigureOut">
               <a:rPr lang="en-US" smtClean="0"/>
-              <a:t>3/1/23</a:t>
+              <a:t>3/9/23</a:t>
             </a:fld>
             <a:endParaRPr lang="en-US"/>
           </a:p>
@@ -2821,7 +2931,7 @@
           <a:p>
             <a:fld id="{17EE346A-1225-314F-8E90-18293479AF17}" type="datetimeFigureOut">
               <a:rPr lang="en-US" smtClean="0"/>
-              <a:t>3/1/23</a:t>
+              <a:t>3/9/23</a:t>
             </a:fld>
             <a:endParaRPr lang="en-US"/>
           </a:p>
@@ -3236,7 +3346,7 @@
           <a:p>
             <a:fld id="{17EE346A-1225-314F-8E90-18293479AF17}" type="datetimeFigureOut">
               <a:rPr lang="en-US" smtClean="0"/>
-              <a:t>3/1/23</a:t>
+              <a:t>3/9/23</a:t>
             </a:fld>
             <a:endParaRPr lang="en-US"/>
           </a:p>
@@ -3378,7 +3488,7 @@
           <a:p>
             <a:fld id="{17EE346A-1225-314F-8E90-18293479AF17}" type="datetimeFigureOut">
               <a:rPr lang="en-US" smtClean="0"/>
-              <a:t>3/1/23</a:t>
+              <a:t>3/9/23</a:t>
             </a:fld>
             <a:endParaRPr lang="en-US"/>
           </a:p>
@@ -3491,7 +3601,7 @@
           <a:p>
             <a:fld id="{17EE346A-1225-314F-8E90-18293479AF17}" type="datetimeFigureOut">
               <a:rPr lang="en-US" smtClean="0"/>
-              <a:t>3/1/23</a:t>
+              <a:t>3/9/23</a:t>
             </a:fld>
             <a:endParaRPr lang="en-US"/>
           </a:p>
@@ -3804,7 +3914,7 @@
           <a:p>
             <a:fld id="{17EE346A-1225-314F-8E90-18293479AF17}" type="datetimeFigureOut">
               <a:rPr lang="en-US" smtClean="0"/>
-              <a:t>3/1/23</a:t>
+              <a:t>3/9/23</a:t>
             </a:fld>
             <a:endParaRPr lang="en-US"/>
           </a:p>
@@ -4093,7 +4203,7 @@
           <a:p>
             <a:fld id="{17EE346A-1225-314F-8E90-18293479AF17}" type="datetimeFigureOut">
               <a:rPr lang="en-US" smtClean="0"/>
-              <a:t>3/1/23</a:t>
+              <a:t>3/9/23</a:t>
             </a:fld>
             <a:endParaRPr lang="en-US"/>
           </a:p>
@@ -4336,7 +4446,7 @@
           <a:p>
             <a:fld id="{17EE346A-1225-314F-8E90-18293479AF17}" type="datetimeFigureOut">
               <a:rPr lang="en-US" smtClean="0"/>
-              <a:t>3/1/23</a:t>
+              <a:t>3/9/23</a:t>
             </a:fld>
             <a:endParaRPr lang="en-US"/>
           </a:p>
@@ -6386,10 +6496,347 @@
           <a:chExt cx="0" cy="0"/>
         </a:xfrm>
       </p:grpSpPr>
+      <p:sp>
+        <p:nvSpPr>
+          <p:cNvPr id="2" name="Title 1">
+            <a:extLst>
+              <a:ext uri="{FF2B5EF4-FFF2-40B4-BE49-F238E27FC236}">
+                <a16:creationId xmlns:a16="http://schemas.microsoft.com/office/drawing/2014/main" id="{9D5C6CC1-7331-744B-00F7-C9838CDDEB66}"/>
+              </a:ext>
+            </a:extLst>
+          </p:cNvPr>
+          <p:cNvSpPr>
+            <a:spLocks noGrp="1"/>
+          </p:cNvSpPr>
+          <p:nvPr>
+            <p:ph type="title"/>
+          </p:nvPr>
+        </p:nvSpPr>
+        <p:spPr/>
+        <p:txBody>
+          <a:bodyPr/>
+          <a:lstStyle/>
+          <a:p>
+            <a:r>
+              <a:rPr lang="en-US" dirty="0"/>
+              <a:t>Testing Model Functionality</a:t>
+            </a:r>
+          </a:p>
+        </p:txBody>
+      </p:sp>
+      <p:sp>
+        <p:nvSpPr>
+          <p:cNvPr id="3" name="Text Placeholder 2">
+            <a:extLst>
+              <a:ext uri="{FF2B5EF4-FFF2-40B4-BE49-F238E27FC236}">
+                <a16:creationId xmlns:a16="http://schemas.microsoft.com/office/drawing/2014/main" id="{AAE9FE35-5ACA-6517-479D-B55C3B7CBC6D}"/>
+              </a:ext>
+            </a:extLst>
+          </p:cNvPr>
+          <p:cNvSpPr>
+            <a:spLocks noGrp="1"/>
+          </p:cNvSpPr>
+          <p:nvPr>
+            <p:ph type="body" idx="1"/>
+          </p:nvPr>
+        </p:nvSpPr>
+        <p:spPr/>
+        <p:txBody>
+          <a:bodyPr/>
+          <a:lstStyle/>
+          <a:p>
+            <a:endParaRPr lang="en-US"/>
+          </a:p>
+        </p:txBody>
+      </p:sp>
     </p:spTree>
     <p:extLst>
       <p:ext uri="{BB962C8B-B14F-4D97-AF65-F5344CB8AC3E}">
-        <p14:creationId xmlns:p14="http://schemas.microsoft.com/office/powerpoint/2010/main" val="1859828439"/>
+        <p14:creationId xmlns:p14="http://schemas.microsoft.com/office/powerpoint/2010/main" val="1549157115"/>
+      </p:ext>
+    </p:extLst>
+  </p:cSld>
+  <p:clrMapOvr>
+    <a:masterClrMapping/>
+  </p:clrMapOvr>
+</p:sld>
+</file>
+
+<file path=ppt/slides/slide8.xml><?xml version="1.0" encoding="utf-8"?>
+<p:sld xmlns:a="http://schemas.openxmlformats.org/drawingml/2006/main" xmlns:r="http://schemas.openxmlformats.org/officeDocument/2006/relationships" xmlns:p="http://schemas.openxmlformats.org/presentationml/2006/main">
+  <p:cSld>
+    <p:spTree>
+      <p:nvGrpSpPr>
+        <p:cNvPr id="1" name=""/>
+        <p:cNvGrpSpPr/>
+        <p:nvPr/>
+      </p:nvGrpSpPr>
+      <p:grpSpPr>
+        <a:xfrm>
+          <a:off x="0" y="0"/>
+          <a:ext cx="0" cy="0"/>
+          <a:chOff x="0" y="0"/>
+          <a:chExt cx="0" cy="0"/>
+        </a:xfrm>
+      </p:grpSpPr>
+      <p:sp>
+        <p:nvSpPr>
+          <p:cNvPr id="2" name="Title 1">
+            <a:extLst>
+              <a:ext uri="{FF2B5EF4-FFF2-40B4-BE49-F238E27FC236}">
+                <a16:creationId xmlns:a16="http://schemas.microsoft.com/office/drawing/2014/main" id="{8C7025F6-38A4-71F1-C210-81672BD3EB6D}"/>
+              </a:ext>
+            </a:extLst>
+          </p:cNvPr>
+          <p:cNvSpPr>
+            <a:spLocks noGrp="1"/>
+          </p:cNvSpPr>
+          <p:nvPr>
+            <p:ph type="title"/>
+          </p:nvPr>
+        </p:nvSpPr>
+        <p:spPr/>
+        <p:txBody>
+          <a:bodyPr/>
+          <a:lstStyle/>
+          <a:p>
+            <a:r>
+              <a:rPr lang="en-US" dirty="0"/>
+              <a:t>Immunity Decay Test</a:t>
+            </a:r>
+          </a:p>
+        </p:txBody>
+      </p:sp>
+      <p:sp>
+        <p:nvSpPr>
+          <p:cNvPr id="3" name="Content Placeholder 2">
+            <a:extLst>
+              <a:ext uri="{FF2B5EF4-FFF2-40B4-BE49-F238E27FC236}">
+                <a16:creationId xmlns:a16="http://schemas.microsoft.com/office/drawing/2014/main" id="{6CD2E1C0-CEC2-1E06-3848-7EE195EB6372}"/>
+              </a:ext>
+            </a:extLst>
+          </p:cNvPr>
+          <p:cNvSpPr>
+            <a:spLocks noGrp="1"/>
+          </p:cNvSpPr>
+          <p:nvPr>
+            <p:ph idx="1"/>
+          </p:nvPr>
+        </p:nvSpPr>
+        <p:spPr/>
+        <p:txBody>
+          <a:bodyPr>
+            <a:normAutofit fontScale="77500" lnSpcReduction="20000"/>
+          </a:bodyPr>
+          <a:lstStyle/>
+          <a:p>
+            <a:endParaRPr lang="en-US" dirty="0"/>
+          </a:p>
+          <a:p>
+            <a:r>
+              <a:rPr lang="en-US" dirty="0"/>
+              <a:t>See </a:t>
+            </a:r>
+            <a:r>
+              <a:rPr lang="en-US" dirty="0" err="1"/>
+              <a:t>Imm-test.R</a:t>
+            </a:r>
+            <a:r>
+              <a:rPr lang="en-US" dirty="0"/>
+              <a:t> (08/03/23)</a:t>
+            </a:r>
+          </a:p>
+          <a:p>
+            <a:r>
+              <a:rPr lang="en-US" dirty="0"/>
+              <a:t># Run model with conditions to replicate </a:t>
+            </a:r>
+            <a:r>
+              <a:rPr lang="en-US" dirty="0" err="1"/>
+              <a:t>Bodjo</a:t>
+            </a:r>
+            <a:r>
+              <a:rPr lang="en-US" dirty="0"/>
+              <a:t> et al paper where offspring immunity dynamics are drawn from.</a:t>
+            </a:r>
+          </a:p>
+          <a:p>
+            <a:pPr lvl="1"/>
+            <a:r>
+              <a:rPr lang="en-US" dirty="0"/>
+              <a:t>Tested duration of maternal immunity in 112 lambs up to 150 days after birth, born to ewes vaccinated with the homologous PPR vaccine “Nigeria 75/1" at day 90 and day 120 of pregnancy.</a:t>
+            </a:r>
+          </a:p>
+          <a:p>
+            <a:endParaRPr lang="en-US" dirty="0"/>
+          </a:p>
+          <a:p>
+            <a:r>
+              <a:rPr lang="en-US" dirty="0"/>
+              <a:t># Parameters: </a:t>
+            </a:r>
+          </a:p>
+          <a:p>
+            <a:r>
+              <a:rPr lang="en-US" dirty="0"/>
+              <a:t># - set 112 lambs to immune compartment </a:t>
+            </a:r>
+          </a:p>
+          <a:p>
+            <a:r>
+              <a:rPr lang="en-US" dirty="0"/>
+              <a:t># - set rest of population to 0</a:t>
+            </a:r>
+          </a:p>
+          <a:p>
+            <a:r>
+              <a:rPr lang="en-US" dirty="0"/>
+              <a:t># - set mortality, offtake, and all demographic rates (except immune decay) to 0</a:t>
+            </a:r>
+          </a:p>
+          <a:p>
+            <a:r>
+              <a:rPr lang="en-US" dirty="0"/>
+              <a:t># - plot proportion immune for first 6 months of simulation </a:t>
+            </a:r>
+          </a:p>
+          <a:p>
+            <a:r>
+              <a:rPr lang="en-US" dirty="0"/>
+              <a:t># - plot should mirror the immune decay from </a:t>
+            </a:r>
+            <a:r>
+              <a:rPr lang="en-US" dirty="0" err="1"/>
+              <a:t>Bodjo</a:t>
+            </a:r>
+            <a:r>
+              <a:rPr lang="en-US" dirty="0"/>
+              <a:t> raw data</a:t>
+            </a:r>
+          </a:p>
+        </p:txBody>
+      </p:sp>
+      <p:pic>
+        <p:nvPicPr>
+          <p:cNvPr id="4" name="Picture 3" descr="Chart, line chart&#10;&#10;Description automatically generated">
+            <a:extLst>
+              <a:ext uri="{FF2B5EF4-FFF2-40B4-BE49-F238E27FC236}">
+                <a16:creationId xmlns:a16="http://schemas.microsoft.com/office/drawing/2014/main" id="{DB16E72D-EE15-CD23-E03C-BC00A171E81E}"/>
+              </a:ext>
+            </a:extLst>
+          </p:cNvPr>
+          <p:cNvPicPr>
+            <a:picLocks noChangeAspect="1"/>
+          </p:cNvPicPr>
+          <p:nvPr/>
+        </p:nvPicPr>
+        <p:blipFill>
+          <a:blip r:embed="rId2"/>
+          <a:stretch>
+            <a:fillRect/>
+          </a:stretch>
+        </p:blipFill>
+        <p:spPr>
+          <a:xfrm>
+            <a:off x="7703577" y="3619314"/>
+            <a:ext cx="4142860" cy="2799416"/>
+          </a:xfrm>
+          <a:prstGeom prst="rect">
+            <a:avLst/>
+          </a:prstGeom>
+        </p:spPr>
+      </p:pic>
+    </p:spTree>
+    <p:extLst>
+      <p:ext uri="{BB962C8B-B14F-4D97-AF65-F5344CB8AC3E}">
+        <p14:creationId xmlns:p14="http://schemas.microsoft.com/office/powerpoint/2010/main" val="955302800"/>
+      </p:ext>
+    </p:extLst>
+  </p:cSld>
+  <p:clrMapOvr>
+    <a:masterClrMapping/>
+  </p:clrMapOvr>
+</p:sld>
+</file>
+
+<file path=ppt/slides/slide9.xml><?xml version="1.0" encoding="utf-8"?>
+<p:sld xmlns:a="http://schemas.openxmlformats.org/drawingml/2006/main" xmlns:r="http://schemas.openxmlformats.org/officeDocument/2006/relationships" xmlns:p="http://schemas.openxmlformats.org/presentationml/2006/main">
+  <p:cSld>
+    <p:spTree>
+      <p:nvGrpSpPr>
+        <p:cNvPr id="1" name=""/>
+        <p:cNvGrpSpPr/>
+        <p:nvPr/>
+      </p:nvGrpSpPr>
+      <p:grpSpPr>
+        <a:xfrm>
+          <a:off x="0" y="0"/>
+          <a:ext cx="0" cy="0"/>
+          <a:chOff x="0" y="0"/>
+          <a:chExt cx="0" cy="0"/>
+        </a:xfrm>
+      </p:grpSpPr>
+      <p:sp>
+        <p:nvSpPr>
+          <p:cNvPr id="2" name="Title 1">
+            <a:extLst>
+              <a:ext uri="{FF2B5EF4-FFF2-40B4-BE49-F238E27FC236}">
+                <a16:creationId xmlns:a16="http://schemas.microsoft.com/office/drawing/2014/main" id="{B69E2D86-3324-8802-4A9F-3F499F519DA0}"/>
+              </a:ext>
+            </a:extLst>
+          </p:cNvPr>
+          <p:cNvSpPr>
+            <a:spLocks noGrp="1"/>
+          </p:cNvSpPr>
+          <p:nvPr>
+            <p:ph type="title"/>
+          </p:nvPr>
+        </p:nvSpPr>
+        <p:spPr/>
+        <p:txBody>
+          <a:bodyPr/>
+          <a:lstStyle/>
+          <a:p>
+            <a:r>
+              <a:rPr lang="en-US"/>
+              <a:t>Model output</a:t>
+            </a:r>
+          </a:p>
+        </p:txBody>
+      </p:sp>
+      <p:pic>
+        <p:nvPicPr>
+          <p:cNvPr id="5" name="Content Placeholder 4" descr="Chart, line chart&#10;&#10;Description automatically generated">
+            <a:extLst>
+              <a:ext uri="{FF2B5EF4-FFF2-40B4-BE49-F238E27FC236}">
+                <a16:creationId xmlns:a16="http://schemas.microsoft.com/office/drawing/2014/main" id="{67879477-76D7-7E4E-9FCF-BD8C428F9321}"/>
+              </a:ext>
+            </a:extLst>
+          </p:cNvPr>
+          <p:cNvPicPr>
+            <a:picLocks noGrp="1" noChangeAspect="1"/>
+          </p:cNvPicPr>
+          <p:nvPr>
+            <p:ph idx="1"/>
+          </p:nvPr>
+        </p:nvPicPr>
+        <p:blipFill>
+          <a:blip r:embed="rId2"/>
+          <a:stretch>
+            <a:fillRect/>
+          </a:stretch>
+        </p:blipFill>
+        <p:spPr>
+          <a:xfrm>
+            <a:off x="3158586" y="1825625"/>
+            <a:ext cx="5874828" cy="4351338"/>
+          </a:xfrm>
+        </p:spPr>
+      </p:pic>
+    </p:spTree>
+    <p:extLst>
+      <p:ext uri="{BB962C8B-B14F-4D97-AF65-F5344CB8AC3E}">
+        <p14:creationId xmlns:p14="http://schemas.microsoft.com/office/powerpoint/2010/main" val="3349671045"/>
       </p:ext>
     </p:extLst>
   </p:cSld>

</xml_diff>

<commit_message>
tidy model file structure and add .Rmd for testing
</commit_message>
<xml_diff>
--- a/results-presentations/model-test-BAOBAB.pptx
+++ b/results-presentations/model-test-BAOBAB.pptx
@@ -450,7 +450,7 @@
   <pc:docChgLst>
     <pc:chgData name="Savagar, Bethan Alice" userId="dc0b6509-dca5-46f6-b355-e03f7348faa9" providerId="ADAL" clId="{3A5BAB18-A7D2-1646-8C2B-E00ADF9A013D}"/>
     <pc:docChg chg="custSel addSld delSld modSld">
-      <pc:chgData name="Savagar, Bethan Alice" userId="dc0b6509-dca5-46f6-b355-e03f7348faa9" providerId="ADAL" clId="{3A5BAB18-A7D2-1646-8C2B-E00ADF9A013D}" dt="2023-03-09T12:36:09.568" v="819" actId="20577"/>
+      <pc:chgData name="Savagar, Bethan Alice" userId="dc0b6509-dca5-46f6-b355-e03f7348faa9" providerId="ADAL" clId="{3A5BAB18-A7D2-1646-8C2B-E00ADF9A013D}" dt="2023-03-14T10:14:28.913" v="822" actId="1076"/>
       <pc:docMkLst>
         <pc:docMk/>
       </pc:docMkLst>
@@ -553,7 +553,7 @@
         </pc:spChg>
       </pc:sldChg>
       <pc:sldChg chg="addSp modSp new mod">
-        <pc:chgData name="Savagar, Bethan Alice" userId="dc0b6509-dca5-46f6-b355-e03f7348faa9" providerId="ADAL" clId="{3A5BAB18-A7D2-1646-8C2B-E00ADF9A013D}" dt="2023-03-09T10:05:55.540" v="802" actId="27636"/>
+        <pc:chgData name="Savagar, Bethan Alice" userId="dc0b6509-dca5-46f6-b355-e03f7348faa9" providerId="ADAL" clId="{3A5BAB18-A7D2-1646-8C2B-E00ADF9A013D}" dt="2023-03-14T10:14:28.913" v="822" actId="1076"/>
         <pc:sldMkLst>
           <pc:docMk/>
           <pc:sldMk cId="955302800" sldId="268"/>
@@ -567,7 +567,7 @@
           </ac:spMkLst>
         </pc:spChg>
         <pc:spChg chg="mod">
-          <ac:chgData name="Savagar, Bethan Alice" userId="dc0b6509-dca5-46f6-b355-e03f7348faa9" providerId="ADAL" clId="{3A5BAB18-A7D2-1646-8C2B-E00ADF9A013D}" dt="2023-03-09T10:05:55.540" v="802" actId="27636"/>
+          <ac:chgData name="Savagar, Bethan Alice" userId="dc0b6509-dca5-46f6-b355-e03f7348faa9" providerId="ADAL" clId="{3A5BAB18-A7D2-1646-8C2B-E00ADF9A013D}" dt="2023-03-14T10:14:18.942" v="821" actId="27636"/>
           <ac:spMkLst>
             <pc:docMk/>
             <pc:sldMk cId="955302800" sldId="268"/>
@@ -575,7 +575,7 @@
           </ac:spMkLst>
         </pc:spChg>
         <pc:picChg chg="add mod">
-          <ac:chgData name="Savagar, Bethan Alice" userId="dc0b6509-dca5-46f6-b355-e03f7348faa9" providerId="ADAL" clId="{3A5BAB18-A7D2-1646-8C2B-E00ADF9A013D}" dt="2023-03-09T10:05:13.251" v="745" actId="1076"/>
+          <ac:chgData name="Savagar, Bethan Alice" userId="dc0b6509-dca5-46f6-b355-e03f7348faa9" providerId="ADAL" clId="{3A5BAB18-A7D2-1646-8C2B-E00ADF9A013D}" dt="2023-03-14T10:14:28.913" v="822" actId="1076"/>
           <ac:picMkLst>
             <pc:docMk/>
             <pc:sldMk cId="955302800" sldId="268"/>
@@ -757,7 +757,7 @@
           <a:p>
             <a:fld id="{12BFABB2-EEA0-864E-BF55-7EF7D8AD924B}" type="datetimeFigureOut">
               <a:rPr lang="en-US" smtClean="0"/>
-              <a:t>3/9/23</a:t>
+              <a:t>3/14/23</a:t>
             </a:fld>
             <a:endParaRPr lang="en-US"/>
           </a:p>
@@ -1777,7 +1777,7 @@
           <a:p>
             <a:fld id="{17EE346A-1225-314F-8E90-18293479AF17}" type="datetimeFigureOut">
               <a:rPr lang="en-US" smtClean="0"/>
-              <a:t>3/9/23</a:t>
+              <a:t>3/14/23</a:t>
             </a:fld>
             <a:endParaRPr lang="en-US"/>
           </a:p>
@@ -1977,7 +1977,7 @@
           <a:p>
             <a:fld id="{17EE346A-1225-314F-8E90-18293479AF17}" type="datetimeFigureOut">
               <a:rPr lang="en-US" smtClean="0"/>
-              <a:t>3/9/23</a:t>
+              <a:t>3/14/23</a:t>
             </a:fld>
             <a:endParaRPr lang="en-US"/>
           </a:p>
@@ -2187,7 +2187,7 @@
           <a:p>
             <a:fld id="{17EE346A-1225-314F-8E90-18293479AF17}" type="datetimeFigureOut">
               <a:rPr lang="en-US" smtClean="0"/>
-              <a:t>3/9/23</a:t>
+              <a:t>3/14/23</a:t>
             </a:fld>
             <a:endParaRPr lang="en-US"/>
           </a:p>
@@ -2387,7 +2387,7 @@
           <a:p>
             <a:fld id="{17EE346A-1225-314F-8E90-18293479AF17}" type="datetimeFigureOut">
               <a:rPr lang="en-US" smtClean="0"/>
-              <a:t>3/9/23</a:t>
+              <a:t>3/14/23</a:t>
             </a:fld>
             <a:endParaRPr lang="en-US"/>
           </a:p>
@@ -2663,7 +2663,7 @@
           <a:p>
             <a:fld id="{17EE346A-1225-314F-8E90-18293479AF17}" type="datetimeFigureOut">
               <a:rPr lang="en-US" smtClean="0"/>
-              <a:t>3/9/23</a:t>
+              <a:t>3/14/23</a:t>
             </a:fld>
             <a:endParaRPr lang="en-US"/>
           </a:p>
@@ -2931,7 +2931,7 @@
           <a:p>
             <a:fld id="{17EE346A-1225-314F-8E90-18293479AF17}" type="datetimeFigureOut">
               <a:rPr lang="en-US" smtClean="0"/>
-              <a:t>3/9/23</a:t>
+              <a:t>3/14/23</a:t>
             </a:fld>
             <a:endParaRPr lang="en-US"/>
           </a:p>
@@ -3346,7 +3346,7 @@
           <a:p>
             <a:fld id="{17EE346A-1225-314F-8E90-18293479AF17}" type="datetimeFigureOut">
               <a:rPr lang="en-US" smtClean="0"/>
-              <a:t>3/9/23</a:t>
+              <a:t>3/14/23</a:t>
             </a:fld>
             <a:endParaRPr lang="en-US"/>
           </a:p>
@@ -3488,7 +3488,7 @@
           <a:p>
             <a:fld id="{17EE346A-1225-314F-8E90-18293479AF17}" type="datetimeFigureOut">
               <a:rPr lang="en-US" smtClean="0"/>
-              <a:t>3/9/23</a:t>
+              <a:t>3/14/23</a:t>
             </a:fld>
             <a:endParaRPr lang="en-US"/>
           </a:p>
@@ -3601,7 +3601,7 @@
           <a:p>
             <a:fld id="{17EE346A-1225-314F-8E90-18293479AF17}" type="datetimeFigureOut">
               <a:rPr lang="en-US" smtClean="0"/>
-              <a:t>3/9/23</a:t>
+              <a:t>3/14/23</a:t>
             </a:fld>
             <a:endParaRPr lang="en-US"/>
           </a:p>
@@ -3914,7 +3914,7 @@
           <a:p>
             <a:fld id="{17EE346A-1225-314F-8E90-18293479AF17}" type="datetimeFigureOut">
               <a:rPr lang="en-US" smtClean="0"/>
-              <a:t>3/9/23</a:t>
+              <a:t>3/14/23</a:t>
             </a:fld>
             <a:endParaRPr lang="en-US"/>
           </a:p>
@@ -4203,7 +4203,7 @@
           <a:p>
             <a:fld id="{17EE346A-1225-314F-8E90-18293479AF17}" type="datetimeFigureOut">
               <a:rPr lang="en-US" smtClean="0"/>
-              <a:t>3/9/23</a:t>
+              <a:t>3/14/23</a:t>
             </a:fld>
             <a:endParaRPr lang="en-US"/>
           </a:p>
@@ -4446,7 +4446,7 @@
           <a:p>
             <a:fld id="{17EE346A-1225-314F-8E90-18293479AF17}" type="datetimeFigureOut">
               <a:rPr lang="en-US" smtClean="0"/>
-              <a:t>3/9/23</a:t>
+              <a:t>3/14/23</a:t>
             </a:fld>
             <a:endParaRPr lang="en-US"/>
           </a:p>
@@ -6623,10 +6623,15 @@
             <p:ph idx="1"/>
           </p:nvPr>
         </p:nvSpPr>
-        <p:spPr/>
+        <p:spPr>
+          <a:xfrm>
+            <a:off x="838200" y="1825625"/>
+            <a:ext cx="6865377" cy="4351338"/>
+          </a:xfrm>
+        </p:spPr>
         <p:txBody>
           <a:bodyPr>
-            <a:normAutofit fontScale="77500" lnSpcReduction="20000"/>
+            <a:normAutofit fontScale="62500" lnSpcReduction="20000"/>
           </a:bodyPr>
           <a:lstStyle/>
           <a:p>
@@ -6738,7 +6743,7 @@
         </p:blipFill>
         <p:spPr>
           <a:xfrm>
-            <a:off x="7703577" y="3619314"/>
+            <a:off x="7703577" y="1481025"/>
             <a:ext cx="4142860" cy="2799416"/>
           </a:xfrm>
           <a:prstGeom prst="rect">

</xml_diff>